<commit_message>
Added in class 27
</commit_message>
<xml_diff>
--- a/hw-paper/Presentation.pptx
+++ b/hw-paper/Presentation.pptx
@@ -5,7 +5,7 @@
     <p:sldMasterId id="2147483648" r:id="rId1"/>
   </p:sldMasterIdLst>
   <p:notesMasterIdLst>
-    <p:notesMasterId r:id="rId21"/>
+    <p:notesMasterId r:id="rId20"/>
   </p:notesMasterIdLst>
   <p:sldIdLst>
     <p:sldId id="256" r:id="rId2"/>
@@ -14,19 +14,18 @@
     <p:sldId id="258" r:id="rId5"/>
     <p:sldId id="259" r:id="rId6"/>
     <p:sldId id="262" r:id="rId7"/>
-    <p:sldId id="260" r:id="rId8"/>
-    <p:sldId id="264" r:id="rId9"/>
-    <p:sldId id="268" r:id="rId10"/>
-    <p:sldId id="267" r:id="rId11"/>
-    <p:sldId id="269" r:id="rId12"/>
-    <p:sldId id="270" r:id="rId13"/>
-    <p:sldId id="265" r:id="rId14"/>
-    <p:sldId id="271" r:id="rId15"/>
-    <p:sldId id="272" r:id="rId16"/>
-    <p:sldId id="274" r:id="rId17"/>
-    <p:sldId id="273" r:id="rId18"/>
-    <p:sldId id="275" r:id="rId19"/>
-    <p:sldId id="261" r:id="rId20"/>
+    <p:sldId id="264" r:id="rId8"/>
+    <p:sldId id="268" r:id="rId9"/>
+    <p:sldId id="267" r:id="rId10"/>
+    <p:sldId id="269" r:id="rId11"/>
+    <p:sldId id="270" r:id="rId12"/>
+    <p:sldId id="265" r:id="rId13"/>
+    <p:sldId id="271" r:id="rId14"/>
+    <p:sldId id="272" r:id="rId15"/>
+    <p:sldId id="274" r:id="rId16"/>
+    <p:sldId id="273" r:id="rId17"/>
+    <p:sldId id="275" r:id="rId18"/>
+    <p:sldId id="261" r:id="rId19"/>
   </p:sldIdLst>
   <p:sldSz cx="12192000" cy="6858000"/>
   <p:notesSz cx="6858000" cy="9144000"/>
@@ -125,6 +124,11 @@
       </a:defRPr>
     </a:lvl9pPr>
   </p:defaultTextStyle>
+  <p:extLst>
+    <p:ext uri="{EFAFB233-063F-42B5-8137-9DF3F51BA10A}">
+      <p15:sldGuideLst xmlns:p15="http://schemas.microsoft.com/office/powerpoint/2012/main"/>
+    </p:ext>
+  </p:extLst>
 </p:presentation>
 </file>
 
@@ -210,7 +214,7 @@
           <a:p>
             <a:fld id="{98F54A8C-1B88-4646-9090-B8BD30B1A084}" type="datetimeFigureOut">
               <a:rPr lang="en-US" smtClean="0"/>
-              <a:t>11/26/16</a:t>
+              <a:t>11/29/16</a:t>
             </a:fld>
             <a:endParaRPr lang="en-US"/>
           </a:p>
@@ -630,7 +634,7 @@
           <a:noFill/>
           <a:extLst>
             <a:ext uri="{909E8E84-426E-40dd-AFC4-6F175D3DCCD1}">
-              <a14:hiddenFill xmlns:a14="http://schemas.microsoft.com/office/drawing/2010/main" xmlns="">
+              <a14:hiddenFill xmlns="" xmlns:a14="http://schemas.microsoft.com/office/drawing/2010/main">
                 <a:solidFill>
                   <a:srgbClr val="FFFFFF"/>
                 </a:solidFill>
@@ -690,7 +694,7 @@
             </a:ln>
             <a:extLst>
               <a:ext uri="{91240B29-F687-4f45-9708-019B960494DF}">
-                <a14:hiddenLine xmlns:a14="http://schemas.microsoft.com/office/drawing/2010/main" xmlns="" w="9525">
+                <a14:hiddenLine xmlns="" xmlns:a14="http://schemas.microsoft.com/office/drawing/2010/main" w="9525">
                   <a:solidFill>
                     <a:srgbClr val="000000"/>
                   </a:solidFill>
@@ -780,7 +784,7 @@
             </a:ln>
             <a:extLst>
               <a:ext uri="{91240B29-F687-4f45-9708-019B960494DF}">
-                <a14:hiddenLine xmlns:a14="http://schemas.microsoft.com/office/drawing/2010/main" xmlns="" w="9525">
+                <a14:hiddenLine xmlns="" xmlns:a14="http://schemas.microsoft.com/office/drawing/2010/main" w="9525">
                   <a:solidFill>
                     <a:srgbClr val="000000"/>
                   </a:solidFill>
@@ -870,7 +874,7 @@
             </a:ln>
             <a:extLst>
               <a:ext uri="{91240B29-F687-4f45-9708-019B960494DF}">
-                <a14:hiddenLine xmlns:a14="http://schemas.microsoft.com/office/drawing/2010/main" xmlns="" w="9525">
+                <a14:hiddenLine xmlns="" xmlns:a14="http://schemas.microsoft.com/office/drawing/2010/main" w="9525">
                   <a:solidFill>
                     <a:srgbClr val="000000"/>
                   </a:solidFill>
@@ -904,7 +908,7 @@
             </a:ln>
             <a:extLst>
               <a:ext uri="{91240B29-F687-4f45-9708-019B960494DF}">
-                <a14:hiddenLine xmlns:a14="http://schemas.microsoft.com/office/drawing/2010/main" xmlns="" w="9525">
+                <a14:hiddenLine xmlns="" xmlns:a14="http://schemas.microsoft.com/office/drawing/2010/main" w="9525">
                   <a:solidFill>
                     <a:srgbClr val="000000"/>
                   </a:solidFill>
@@ -994,7 +998,7 @@
             </a:ln>
             <a:extLst>
               <a:ext uri="{91240B29-F687-4f45-9708-019B960494DF}">
-                <a14:hiddenLine xmlns:a14="http://schemas.microsoft.com/office/drawing/2010/main" xmlns="" w="9525">
+                <a14:hiddenLine xmlns="" xmlns:a14="http://schemas.microsoft.com/office/drawing/2010/main" w="9525">
                   <a:solidFill>
                     <a:srgbClr val="000000"/>
                   </a:solidFill>
@@ -1056,7 +1060,7 @@
             </a:ln>
             <a:extLst>
               <a:ext uri="{91240B29-F687-4f45-9708-019B960494DF}">
-                <a14:hiddenLine xmlns:a14="http://schemas.microsoft.com/office/drawing/2010/main" xmlns="" w="9525">
+                <a14:hiddenLine xmlns="" xmlns:a14="http://schemas.microsoft.com/office/drawing/2010/main" w="9525">
                   <a:solidFill>
                     <a:srgbClr val="000000"/>
                   </a:solidFill>
@@ -1118,7 +1122,7 @@
             </a:ln>
             <a:extLst>
               <a:ext uri="{91240B29-F687-4f45-9708-019B960494DF}">
-                <a14:hiddenLine xmlns:a14="http://schemas.microsoft.com/office/drawing/2010/main" xmlns="" w="9525">
+                <a14:hiddenLine xmlns="" xmlns:a14="http://schemas.microsoft.com/office/drawing/2010/main" w="9525">
                   <a:solidFill>
                     <a:srgbClr val="000000"/>
                   </a:solidFill>
@@ -1208,7 +1212,7 @@
             </a:ln>
             <a:extLst>
               <a:ext uri="{91240B29-F687-4f45-9708-019B960494DF}">
-                <a14:hiddenLine xmlns:a14="http://schemas.microsoft.com/office/drawing/2010/main" xmlns="" w="9525">
+                <a14:hiddenLine xmlns="" xmlns:a14="http://schemas.microsoft.com/office/drawing/2010/main" w="9525">
                   <a:solidFill>
                     <a:srgbClr val="000000"/>
                   </a:solidFill>
@@ -1270,7 +1274,7 @@
             </a:ln>
             <a:extLst>
               <a:ext uri="{91240B29-F687-4f45-9708-019B960494DF}">
-                <a14:hiddenLine xmlns:a14="http://schemas.microsoft.com/office/drawing/2010/main" xmlns="" w="9525">
+                <a14:hiddenLine xmlns="" xmlns:a14="http://schemas.microsoft.com/office/drawing/2010/main" w="9525">
                   <a:solidFill>
                     <a:srgbClr val="000000"/>
                   </a:solidFill>
@@ -1332,7 +1336,7 @@
             </a:ln>
             <a:extLst>
               <a:ext uri="{91240B29-F687-4f45-9708-019B960494DF}">
-                <a14:hiddenLine xmlns:a14="http://schemas.microsoft.com/office/drawing/2010/main" xmlns="" w="9525">
+                <a14:hiddenLine xmlns="" xmlns:a14="http://schemas.microsoft.com/office/drawing/2010/main" w="9525">
                   <a:solidFill>
                     <a:srgbClr val="000000"/>
                   </a:solidFill>
@@ -1422,7 +1426,7 @@
             </a:ln>
             <a:extLst>
               <a:ext uri="{91240B29-F687-4f45-9708-019B960494DF}">
-                <a14:hiddenLine xmlns:a14="http://schemas.microsoft.com/office/drawing/2010/main" xmlns="" w="9525">
+                <a14:hiddenLine xmlns="" xmlns:a14="http://schemas.microsoft.com/office/drawing/2010/main" w="9525">
                   <a:solidFill>
                     <a:srgbClr val="000000"/>
                   </a:solidFill>
@@ -1512,7 +1516,7 @@
             </a:ln>
             <a:extLst>
               <a:ext uri="{91240B29-F687-4f45-9708-019B960494DF}">
-                <a14:hiddenLine xmlns:a14="http://schemas.microsoft.com/office/drawing/2010/main" xmlns="" w="9525">
+                <a14:hiddenLine xmlns="" xmlns:a14="http://schemas.microsoft.com/office/drawing/2010/main" w="9525">
                   <a:solidFill>
                     <a:srgbClr val="000000"/>
                   </a:solidFill>
@@ -1574,7 +1578,7 @@
             </a:ln>
             <a:extLst>
               <a:ext uri="{91240B29-F687-4f45-9708-019B960494DF}">
-                <a14:hiddenLine xmlns:a14="http://schemas.microsoft.com/office/drawing/2010/main" xmlns="" w="9525">
+                <a14:hiddenLine xmlns="" xmlns:a14="http://schemas.microsoft.com/office/drawing/2010/main" w="9525">
                   <a:solidFill>
                     <a:srgbClr val="000000"/>
                   </a:solidFill>
@@ -1684,7 +1688,7 @@
             </a:ln>
             <a:extLst>
               <a:ext uri="{91240B29-F687-4f45-9708-019B960494DF}">
-                <a14:hiddenLine xmlns:a14="http://schemas.microsoft.com/office/drawing/2010/main" xmlns="" w="9525">
+                <a14:hiddenLine xmlns="" xmlns:a14="http://schemas.microsoft.com/office/drawing/2010/main" w="9525">
                   <a:solidFill>
                     <a:srgbClr val="000000"/>
                   </a:solidFill>
@@ -1746,7 +1750,7 @@
             </a:ln>
             <a:extLst>
               <a:ext uri="{91240B29-F687-4f45-9708-019B960494DF}">
-                <a14:hiddenLine xmlns:a14="http://schemas.microsoft.com/office/drawing/2010/main" xmlns="" w="9525">
+                <a14:hiddenLine xmlns="" xmlns:a14="http://schemas.microsoft.com/office/drawing/2010/main" w="9525">
                   <a:solidFill>
                     <a:srgbClr val="000000"/>
                   </a:solidFill>
@@ -1836,7 +1840,7 @@
             </a:ln>
             <a:extLst>
               <a:ext uri="{91240B29-F687-4f45-9708-019B960494DF}">
-                <a14:hiddenLine xmlns:a14="http://schemas.microsoft.com/office/drawing/2010/main" xmlns="" w="9525">
+                <a14:hiddenLine xmlns="" xmlns:a14="http://schemas.microsoft.com/office/drawing/2010/main" w="9525">
                   <a:solidFill>
                     <a:srgbClr val="000000"/>
                   </a:solidFill>
@@ -1926,7 +1930,7 @@
             </a:ln>
             <a:extLst>
               <a:ext uri="{91240B29-F687-4f45-9708-019B960494DF}">
-                <a14:hiddenLine xmlns:a14="http://schemas.microsoft.com/office/drawing/2010/main" xmlns="" w="9525">
+                <a14:hiddenLine xmlns="" xmlns:a14="http://schemas.microsoft.com/office/drawing/2010/main" w="9525">
                   <a:solidFill>
                     <a:srgbClr val="000000"/>
                   </a:solidFill>
@@ -1988,7 +1992,7 @@
             </a:ln>
             <a:extLst>
               <a:ext uri="{91240B29-F687-4f45-9708-019B960494DF}">
-                <a14:hiddenLine xmlns:a14="http://schemas.microsoft.com/office/drawing/2010/main" xmlns="" w="9525">
+                <a14:hiddenLine xmlns="" xmlns:a14="http://schemas.microsoft.com/office/drawing/2010/main" w="9525">
                   <a:solidFill>
                     <a:srgbClr val="000000"/>
                   </a:solidFill>
@@ -2078,7 +2082,7 @@
             </a:ln>
             <a:extLst>
               <a:ext uri="{91240B29-F687-4f45-9708-019B960494DF}">
-                <a14:hiddenLine xmlns:a14="http://schemas.microsoft.com/office/drawing/2010/main" xmlns="" w="9525">
+                <a14:hiddenLine xmlns="" xmlns:a14="http://schemas.microsoft.com/office/drawing/2010/main" w="9525">
                   <a:solidFill>
                     <a:srgbClr val="000000"/>
                   </a:solidFill>
@@ -2168,7 +2172,7 @@
             </a:ln>
             <a:extLst>
               <a:ext uri="{91240B29-F687-4f45-9708-019B960494DF}">
-                <a14:hiddenLine xmlns:a14="http://schemas.microsoft.com/office/drawing/2010/main" xmlns="" w="9525">
+                <a14:hiddenLine xmlns="" xmlns:a14="http://schemas.microsoft.com/office/drawing/2010/main" w="9525">
                   <a:solidFill>
                     <a:srgbClr val="000000"/>
                   </a:solidFill>
@@ -2224,7 +2228,7 @@
             </a:ln>
             <a:extLst>
               <a:ext uri="{91240B29-F687-4f45-9708-019B960494DF}">
-                <a14:hiddenLine xmlns:a14="http://schemas.microsoft.com/office/drawing/2010/main" xmlns="" w="9525">
+                <a14:hiddenLine xmlns="" xmlns:a14="http://schemas.microsoft.com/office/drawing/2010/main" w="9525">
                   <a:solidFill>
                     <a:srgbClr val="000000"/>
                   </a:solidFill>
@@ -2314,7 +2318,7 @@
             </a:ln>
             <a:extLst>
               <a:ext uri="{91240B29-F687-4f45-9708-019B960494DF}">
-                <a14:hiddenLine xmlns:a14="http://schemas.microsoft.com/office/drawing/2010/main" xmlns="" w="9525">
+                <a14:hiddenLine xmlns="" xmlns:a14="http://schemas.microsoft.com/office/drawing/2010/main" w="9525">
                   <a:solidFill>
                     <a:srgbClr val="000000"/>
                   </a:solidFill>
@@ -2370,7 +2374,7 @@
             </a:ln>
             <a:extLst>
               <a:ext uri="{91240B29-F687-4f45-9708-019B960494DF}">
-                <a14:hiddenLine xmlns:a14="http://schemas.microsoft.com/office/drawing/2010/main" xmlns="" w="9525">
+                <a14:hiddenLine xmlns="" xmlns:a14="http://schemas.microsoft.com/office/drawing/2010/main" w="9525">
                   <a:solidFill>
                     <a:srgbClr val="000000"/>
                   </a:solidFill>
@@ -2460,7 +2464,7 @@
             </a:ln>
             <a:extLst>
               <a:ext uri="{91240B29-F687-4f45-9708-019B960494DF}">
-                <a14:hiddenLine xmlns:a14="http://schemas.microsoft.com/office/drawing/2010/main" xmlns="" w="9525">
+                <a14:hiddenLine xmlns="" xmlns:a14="http://schemas.microsoft.com/office/drawing/2010/main" w="9525">
                   <a:solidFill>
                     <a:srgbClr val="000000"/>
                   </a:solidFill>
@@ -2528,7 +2532,7 @@
             </a:ln>
             <a:extLst>
               <a:ext uri="{91240B29-F687-4f45-9708-019B960494DF}">
-                <a14:hiddenLine xmlns:a14="http://schemas.microsoft.com/office/drawing/2010/main" xmlns="" w="9525">
+                <a14:hiddenLine xmlns="" xmlns:a14="http://schemas.microsoft.com/office/drawing/2010/main" w="9525">
                   <a:solidFill>
                     <a:srgbClr val="000000"/>
                   </a:solidFill>
@@ -2618,7 +2622,7 @@
             </a:ln>
             <a:extLst>
               <a:ext uri="{91240B29-F687-4f45-9708-019B960494DF}">
-                <a14:hiddenLine xmlns:a14="http://schemas.microsoft.com/office/drawing/2010/main" xmlns="" w="9525">
+                <a14:hiddenLine xmlns="" xmlns:a14="http://schemas.microsoft.com/office/drawing/2010/main" w="9525">
                   <a:solidFill>
                     <a:srgbClr val="000000"/>
                   </a:solidFill>
@@ -2686,7 +2690,7 @@
             </a:ln>
             <a:extLst>
               <a:ext uri="{91240B29-F687-4f45-9708-019B960494DF}">
-                <a14:hiddenLine xmlns:a14="http://schemas.microsoft.com/office/drawing/2010/main" xmlns="" w="9525">
+                <a14:hiddenLine xmlns="" xmlns:a14="http://schemas.microsoft.com/office/drawing/2010/main" w="9525">
                   <a:solidFill>
                     <a:srgbClr val="000000"/>
                   </a:solidFill>
@@ -2776,7 +2780,7 @@
             </a:ln>
             <a:extLst>
               <a:ext uri="{91240B29-F687-4f45-9708-019B960494DF}">
-                <a14:hiddenLine xmlns:a14="http://schemas.microsoft.com/office/drawing/2010/main" xmlns="" w="9525">
+                <a14:hiddenLine xmlns="" xmlns:a14="http://schemas.microsoft.com/office/drawing/2010/main" w="9525">
                   <a:solidFill>
                     <a:srgbClr val="000000"/>
                   </a:solidFill>
@@ -2810,7 +2814,7 @@
             </a:ln>
             <a:extLst>
               <a:ext uri="{91240B29-F687-4f45-9708-019B960494DF}">
-                <a14:hiddenLine xmlns:a14="http://schemas.microsoft.com/office/drawing/2010/main" xmlns="" w="9525">
+                <a14:hiddenLine xmlns="" xmlns:a14="http://schemas.microsoft.com/office/drawing/2010/main" w="9525">
                   <a:solidFill>
                     <a:srgbClr val="000000"/>
                   </a:solidFill>
@@ -2900,7 +2904,7 @@
             </a:ln>
             <a:extLst>
               <a:ext uri="{91240B29-F687-4f45-9708-019B960494DF}">
-                <a14:hiddenLine xmlns:a14="http://schemas.microsoft.com/office/drawing/2010/main" xmlns="" w="9525">
+                <a14:hiddenLine xmlns="" xmlns:a14="http://schemas.microsoft.com/office/drawing/2010/main" w="9525">
                   <a:solidFill>
                     <a:srgbClr val="000000"/>
                   </a:solidFill>
@@ -2962,7 +2966,7 @@
             </a:ln>
             <a:extLst>
               <a:ext uri="{91240B29-F687-4f45-9708-019B960494DF}">
-                <a14:hiddenLine xmlns:a14="http://schemas.microsoft.com/office/drawing/2010/main" xmlns="" w="9525">
+                <a14:hiddenLine xmlns="" xmlns:a14="http://schemas.microsoft.com/office/drawing/2010/main" w="9525">
                   <a:solidFill>
                     <a:srgbClr val="000000"/>
                   </a:solidFill>
@@ -3024,7 +3028,7 @@
             </a:ln>
             <a:extLst>
               <a:ext uri="{91240B29-F687-4f45-9708-019B960494DF}">
-                <a14:hiddenLine xmlns:a14="http://schemas.microsoft.com/office/drawing/2010/main" xmlns="" w="9525">
+                <a14:hiddenLine xmlns="" xmlns:a14="http://schemas.microsoft.com/office/drawing/2010/main" w="9525">
                   <a:solidFill>
                     <a:srgbClr val="000000"/>
                   </a:solidFill>
@@ -3114,7 +3118,7 @@
             </a:ln>
             <a:extLst>
               <a:ext uri="{91240B29-F687-4f45-9708-019B960494DF}">
-                <a14:hiddenLine xmlns:a14="http://schemas.microsoft.com/office/drawing/2010/main" xmlns="" w="9525">
+                <a14:hiddenLine xmlns="" xmlns:a14="http://schemas.microsoft.com/office/drawing/2010/main" w="9525">
                   <a:solidFill>
                     <a:srgbClr val="000000"/>
                   </a:solidFill>
@@ -3182,7 +3186,7 @@
             </a:ln>
             <a:extLst>
               <a:ext uri="{91240B29-F687-4f45-9708-019B960494DF}">
-                <a14:hiddenLine xmlns:a14="http://schemas.microsoft.com/office/drawing/2010/main" xmlns="" w="9525">
+                <a14:hiddenLine xmlns="" xmlns:a14="http://schemas.microsoft.com/office/drawing/2010/main" w="9525">
                   <a:solidFill>
                     <a:srgbClr val="000000"/>
                   </a:solidFill>
@@ -3244,7 +3248,7 @@
             </a:ln>
             <a:extLst>
               <a:ext uri="{91240B29-F687-4f45-9708-019B960494DF}">
-                <a14:hiddenLine xmlns:a14="http://schemas.microsoft.com/office/drawing/2010/main" xmlns="" w="9525">
+                <a14:hiddenLine xmlns="" xmlns:a14="http://schemas.microsoft.com/office/drawing/2010/main" w="9525">
                   <a:solidFill>
                     <a:srgbClr val="000000"/>
                   </a:solidFill>
@@ -3334,7 +3338,7 @@
             </a:ln>
             <a:extLst>
               <a:ext uri="{91240B29-F687-4f45-9708-019B960494DF}">
-                <a14:hiddenLine xmlns:a14="http://schemas.microsoft.com/office/drawing/2010/main" xmlns="" w="9525">
+                <a14:hiddenLine xmlns="" xmlns:a14="http://schemas.microsoft.com/office/drawing/2010/main" w="9525">
                   <a:solidFill>
                     <a:srgbClr val="000000"/>
                   </a:solidFill>
@@ -3396,7 +3400,7 @@
             </a:ln>
             <a:extLst>
               <a:ext uri="{91240B29-F687-4f45-9708-019B960494DF}">
-                <a14:hiddenLine xmlns:a14="http://schemas.microsoft.com/office/drawing/2010/main" xmlns="" w="9525">
+                <a14:hiddenLine xmlns="" xmlns:a14="http://schemas.microsoft.com/office/drawing/2010/main" w="9525">
                   <a:solidFill>
                     <a:srgbClr val="000000"/>
                   </a:solidFill>
@@ -3486,7 +3490,7 @@
             </a:ln>
             <a:extLst>
               <a:ext uri="{91240B29-F687-4f45-9708-019B960494DF}">
-                <a14:hiddenLine xmlns:a14="http://schemas.microsoft.com/office/drawing/2010/main" xmlns="" w="9525">
+                <a14:hiddenLine xmlns="" xmlns:a14="http://schemas.microsoft.com/office/drawing/2010/main" w="9525">
                   <a:solidFill>
                     <a:srgbClr val="000000"/>
                   </a:solidFill>
@@ -3548,7 +3552,7 @@
             </a:ln>
             <a:extLst>
               <a:ext uri="{91240B29-F687-4f45-9708-019B960494DF}">
-                <a14:hiddenLine xmlns:a14="http://schemas.microsoft.com/office/drawing/2010/main" xmlns="" w="9525">
+                <a14:hiddenLine xmlns="" xmlns:a14="http://schemas.microsoft.com/office/drawing/2010/main" w="9525">
                   <a:solidFill>
                     <a:srgbClr val="000000"/>
                   </a:solidFill>
@@ -3638,7 +3642,7 @@
             </a:ln>
             <a:extLst>
               <a:ext uri="{91240B29-F687-4f45-9708-019B960494DF}">
-                <a14:hiddenLine xmlns:a14="http://schemas.microsoft.com/office/drawing/2010/main" xmlns="" w="9525">
+                <a14:hiddenLine xmlns="" xmlns:a14="http://schemas.microsoft.com/office/drawing/2010/main" w="9525">
                   <a:solidFill>
                     <a:srgbClr val="000000"/>
                   </a:solidFill>
@@ -3672,7 +3676,7 @@
             </a:ln>
             <a:extLst>
               <a:ext uri="{91240B29-F687-4f45-9708-019B960494DF}">
-                <a14:hiddenLine xmlns:a14="http://schemas.microsoft.com/office/drawing/2010/main" xmlns="" w="9525">
+                <a14:hiddenLine xmlns="" xmlns:a14="http://schemas.microsoft.com/office/drawing/2010/main" w="9525">
                   <a:solidFill>
                     <a:srgbClr val="000000"/>
                   </a:solidFill>
@@ -3737,7 +3741,7 @@
             </a:ln>
             <a:extLst>
               <a:ext uri="{91240B29-F687-4f45-9708-019B960494DF}">
-                <a14:hiddenLine xmlns:a14="http://schemas.microsoft.com/office/drawing/2010/main" xmlns="" w="9525">
+                <a14:hiddenLine xmlns="" xmlns:a14="http://schemas.microsoft.com/office/drawing/2010/main" w="9525">
                   <a:solidFill>
                     <a:srgbClr val="000000"/>
                   </a:solidFill>
@@ -3827,7 +3831,7 @@
             </a:ln>
             <a:extLst>
               <a:ext uri="{91240B29-F687-4f45-9708-019B960494DF}">
-                <a14:hiddenLine xmlns:a14="http://schemas.microsoft.com/office/drawing/2010/main" xmlns="" w="9525">
+                <a14:hiddenLine xmlns="" xmlns:a14="http://schemas.microsoft.com/office/drawing/2010/main" w="9525">
                   <a:solidFill>
                     <a:srgbClr val="000000"/>
                   </a:solidFill>
@@ -3889,7 +3893,7 @@
             </a:ln>
             <a:extLst>
               <a:ext uri="{91240B29-F687-4f45-9708-019B960494DF}">
-                <a14:hiddenLine xmlns:a14="http://schemas.microsoft.com/office/drawing/2010/main" xmlns="" w="9525">
+                <a14:hiddenLine xmlns="" xmlns:a14="http://schemas.microsoft.com/office/drawing/2010/main" w="9525">
                   <a:solidFill>
                     <a:srgbClr val="000000"/>
                   </a:solidFill>
@@ -3979,7 +3983,7 @@
             </a:ln>
             <a:extLst>
               <a:ext uri="{91240B29-F687-4f45-9708-019B960494DF}">
-                <a14:hiddenLine xmlns:a14="http://schemas.microsoft.com/office/drawing/2010/main" xmlns="" w="9525">
+                <a14:hiddenLine xmlns="" xmlns:a14="http://schemas.microsoft.com/office/drawing/2010/main" w="9525">
                   <a:solidFill>
                     <a:srgbClr val="000000"/>
                   </a:solidFill>
@@ -4069,7 +4073,7 @@
             </a:ln>
             <a:extLst>
               <a:ext uri="{91240B29-F687-4f45-9708-019B960494DF}">
-                <a14:hiddenLine xmlns:a14="http://schemas.microsoft.com/office/drawing/2010/main" xmlns="" w="9525">
+                <a14:hiddenLine xmlns="" xmlns:a14="http://schemas.microsoft.com/office/drawing/2010/main" w="9525">
                   <a:solidFill>
                     <a:srgbClr val="000000"/>
                   </a:solidFill>
@@ -4134,7 +4138,7 @@
             </a:ln>
             <a:extLst>
               <a:ext uri="{91240B29-F687-4f45-9708-019B960494DF}">
-                <a14:hiddenLine xmlns:a14="http://schemas.microsoft.com/office/drawing/2010/main" xmlns="" w="9525">
+                <a14:hiddenLine xmlns="" xmlns:a14="http://schemas.microsoft.com/office/drawing/2010/main" w="9525">
                   <a:solidFill>
                     <a:srgbClr val="000000"/>
                   </a:solidFill>
@@ -4196,7 +4200,7 @@
             </a:ln>
             <a:extLst>
               <a:ext uri="{91240B29-F687-4f45-9708-019B960494DF}">
-                <a14:hiddenLine xmlns:a14="http://schemas.microsoft.com/office/drawing/2010/main" xmlns="" w="9525">
+                <a14:hiddenLine xmlns="" xmlns:a14="http://schemas.microsoft.com/office/drawing/2010/main" w="9525">
                   <a:solidFill>
                     <a:srgbClr val="000000"/>
                   </a:solidFill>
@@ -4286,7 +4290,7 @@
             </a:ln>
             <a:extLst>
               <a:ext uri="{91240B29-F687-4f45-9708-019B960494DF}">
-                <a14:hiddenLine xmlns:a14="http://schemas.microsoft.com/office/drawing/2010/main" xmlns="" w="9525">
+                <a14:hiddenLine xmlns="" xmlns:a14="http://schemas.microsoft.com/office/drawing/2010/main" w="9525">
                   <a:solidFill>
                     <a:srgbClr val="000000"/>
                   </a:solidFill>
@@ -4376,7 +4380,7 @@
             </a:ln>
             <a:extLst>
               <a:ext uri="{91240B29-F687-4f45-9708-019B960494DF}">
-                <a14:hiddenLine xmlns:a14="http://schemas.microsoft.com/office/drawing/2010/main" xmlns="" w="9525">
+                <a14:hiddenLine xmlns="" xmlns:a14="http://schemas.microsoft.com/office/drawing/2010/main" w="9525">
                   <a:solidFill>
                     <a:srgbClr val="000000"/>
                   </a:solidFill>
@@ -4438,7 +4442,7 @@
             </a:ln>
             <a:extLst>
               <a:ext uri="{91240B29-F687-4f45-9708-019B960494DF}">
-                <a14:hiddenLine xmlns:a14="http://schemas.microsoft.com/office/drawing/2010/main" xmlns="" w="9525">
+                <a14:hiddenLine xmlns="" xmlns:a14="http://schemas.microsoft.com/office/drawing/2010/main" w="9525">
                   <a:solidFill>
                     <a:srgbClr val="000000"/>
                   </a:solidFill>
@@ -4558,7 +4562,7 @@
             </a:ln>
             <a:extLst>
               <a:ext uri="{91240B29-F687-4f45-9708-019B960494DF}">
-                <a14:hiddenLine xmlns:a14="http://schemas.microsoft.com/office/drawing/2010/main" xmlns="" w="9525">
+                <a14:hiddenLine xmlns="" xmlns:a14="http://schemas.microsoft.com/office/drawing/2010/main" w="9525">
                   <a:solidFill>
                     <a:srgbClr val="000000"/>
                   </a:solidFill>
@@ -4626,7 +4630,7 @@
             </a:ln>
             <a:extLst>
               <a:ext uri="{91240B29-F687-4f45-9708-019B960494DF}">
-                <a14:hiddenLine xmlns:a14="http://schemas.microsoft.com/office/drawing/2010/main" xmlns="" w="9525">
+                <a14:hiddenLine xmlns="" xmlns:a14="http://schemas.microsoft.com/office/drawing/2010/main" w="9525">
                   <a:solidFill>
                     <a:srgbClr val="000000"/>
                   </a:solidFill>
@@ -4716,7 +4720,7 @@
             </a:ln>
             <a:extLst>
               <a:ext uri="{91240B29-F687-4f45-9708-019B960494DF}">
-                <a14:hiddenLine xmlns:a14="http://schemas.microsoft.com/office/drawing/2010/main" xmlns="" w="9525">
+                <a14:hiddenLine xmlns="" xmlns:a14="http://schemas.microsoft.com/office/drawing/2010/main" w="9525">
                   <a:solidFill>
                     <a:srgbClr val="000000"/>
                   </a:solidFill>
@@ -4856,7 +4860,7 @@
           <a:p>
             <a:fld id="{48A87A34-81AB-432B-8DAE-1953F412C126}" type="datetimeFigureOut">
               <a:rPr lang="en-US" dirty="0"/>
-              <a:t>11/26/16</a:t>
+              <a:t>11/29/16</a:t>
             </a:fld>
             <a:endParaRPr lang="en-US" dirty="0"/>
           </a:p>
@@ -5118,7 +5122,7 @@
           <a:p>
             <a:fld id="{48A87A34-81AB-432B-8DAE-1953F412C126}" type="datetimeFigureOut">
               <a:rPr lang="en-US" dirty="0"/>
-              <a:t>11/26/16</a:t>
+              <a:t>11/29/16</a:t>
             </a:fld>
             <a:endParaRPr lang="en-US" dirty="0"/>
           </a:p>
@@ -5309,7 +5313,7 @@
           <a:p>
             <a:fld id="{48A87A34-81AB-432B-8DAE-1953F412C126}" type="datetimeFigureOut">
               <a:rPr lang="en-US" dirty="0"/>
-              <a:t>11/26/16</a:t>
+              <a:t>11/29/16</a:t>
             </a:fld>
             <a:endParaRPr lang="en-US" dirty="0"/>
           </a:p>
@@ -5567,7 +5571,7 @@
           <a:p>
             <a:fld id="{48A87A34-81AB-432B-8DAE-1953F412C126}" type="datetimeFigureOut">
               <a:rPr lang="en-US" dirty="0"/>
-              <a:t>11/26/16</a:t>
+              <a:t>11/29/16</a:t>
             </a:fld>
             <a:endParaRPr lang="en-US" dirty="0"/>
           </a:p>
@@ -5996,7 +6000,7 @@
           <a:p>
             <a:fld id="{48A87A34-81AB-432B-8DAE-1953F412C126}" type="datetimeFigureOut">
               <a:rPr lang="en-US" dirty="0"/>
-              <a:t>11/26/16</a:t>
+              <a:t>11/29/16</a:t>
             </a:fld>
             <a:endParaRPr lang="en-US" dirty="0"/>
           </a:p>
@@ -6537,7 +6541,7 @@
           <a:p>
             <a:fld id="{48A87A34-81AB-432B-8DAE-1953F412C126}" type="datetimeFigureOut">
               <a:rPr lang="en-US" dirty="0"/>
-              <a:t>11/26/16</a:t>
+              <a:t>11/29/16</a:t>
             </a:fld>
             <a:endParaRPr lang="en-US" dirty="0"/>
           </a:p>
@@ -7252,7 +7256,7 @@
           <a:p>
             <a:fld id="{48A87A34-81AB-432B-8DAE-1953F412C126}" type="datetimeFigureOut">
               <a:rPr lang="en-US" dirty="0"/>
-              <a:t>11/26/16</a:t>
+              <a:t>11/29/16</a:t>
             </a:fld>
             <a:endParaRPr lang="en-US" dirty="0"/>
           </a:p>
@@ -7417,7 +7421,7 @@
           <a:p>
             <a:fld id="{48A87A34-81AB-432B-8DAE-1953F412C126}" type="datetimeFigureOut">
               <a:rPr lang="en-US" dirty="0"/>
-              <a:t>11/26/16</a:t>
+              <a:t>11/29/16</a:t>
             </a:fld>
             <a:endParaRPr lang="en-US" dirty="0"/>
           </a:p>
@@ -7592,7 +7596,7 @@
           <a:p>
             <a:fld id="{48A87A34-81AB-432B-8DAE-1953F412C126}" type="datetimeFigureOut">
               <a:rPr lang="en-US" dirty="0"/>
-              <a:t>11/26/16</a:t>
+              <a:t>11/29/16</a:t>
             </a:fld>
             <a:endParaRPr lang="en-US" dirty="0"/>
           </a:p>
@@ -7757,7 +7761,7 @@
           <a:p>
             <a:fld id="{48A87A34-81AB-432B-8DAE-1953F412C126}" type="datetimeFigureOut">
               <a:rPr lang="en-US" dirty="0"/>
-              <a:t>11/26/16</a:t>
+              <a:t>11/29/16</a:t>
             </a:fld>
             <a:endParaRPr lang="en-US" dirty="0"/>
           </a:p>
@@ -8002,7 +8006,7 @@
           <a:p>
             <a:fld id="{48A87A34-81AB-432B-8DAE-1953F412C126}" type="datetimeFigureOut">
               <a:rPr lang="en-US" dirty="0"/>
-              <a:t>11/26/16</a:t>
+              <a:t>11/29/16</a:t>
             </a:fld>
             <a:endParaRPr lang="en-US" dirty="0"/>
           </a:p>
@@ -8229,7 +8233,7 @@
           <a:p>
             <a:fld id="{48A87A34-81AB-432B-8DAE-1953F412C126}" type="datetimeFigureOut">
               <a:rPr lang="en-US" dirty="0"/>
-              <a:t>11/26/16</a:t>
+              <a:t>11/29/16</a:t>
             </a:fld>
             <a:endParaRPr lang="en-US" dirty="0"/>
           </a:p>
@@ -8605,7 +8609,7 @@
           <a:p>
             <a:fld id="{48A87A34-81AB-432B-8DAE-1953F412C126}" type="datetimeFigureOut">
               <a:rPr lang="en-US" dirty="0"/>
-              <a:t>11/26/16</a:t>
+              <a:t>11/29/16</a:t>
             </a:fld>
             <a:endParaRPr lang="en-US" dirty="0"/>
           </a:p>
@@ -8718,7 +8722,7 @@
           <a:p>
             <a:fld id="{48A87A34-81AB-432B-8DAE-1953F412C126}" type="datetimeFigureOut">
               <a:rPr lang="en-US" dirty="0"/>
-              <a:t>11/26/16</a:t>
+              <a:t>11/29/16</a:t>
             </a:fld>
             <a:endParaRPr lang="en-US" dirty="0"/>
           </a:p>
@@ -8808,7 +8812,7 @@
           <a:p>
             <a:fld id="{48A87A34-81AB-432B-8DAE-1953F412C126}" type="datetimeFigureOut">
               <a:rPr lang="en-US" dirty="0"/>
-              <a:t>11/26/16</a:t>
+              <a:t>11/29/16</a:t>
             </a:fld>
             <a:endParaRPr lang="en-US" dirty="0"/>
           </a:p>
@@ -9052,7 +9056,7 @@
           <a:p>
             <a:fld id="{48A87A34-81AB-432B-8DAE-1953F412C126}" type="datetimeFigureOut">
               <a:rPr lang="en-US" dirty="0"/>
-              <a:t>11/26/16</a:t>
+              <a:t>11/29/16</a:t>
             </a:fld>
             <a:endParaRPr lang="en-US" dirty="0"/>
           </a:p>
@@ -9327,7 +9331,7 @@
           <a:p>
             <a:fld id="{48A87A34-81AB-432B-8DAE-1953F412C126}" type="datetimeFigureOut">
               <a:rPr lang="en-US" dirty="0"/>
-              <a:t>11/26/16</a:t>
+              <a:t>11/29/16</a:t>
             </a:fld>
             <a:endParaRPr lang="en-US" dirty="0"/>
           </a:p>
@@ -9438,7 +9442,7 @@
           <a:noFill/>
           <a:extLst>
             <a:ext uri="{909E8E84-426E-40dd-AFC4-6F175D3DCCD1}">
-              <a14:hiddenFill xmlns:a14="http://schemas.microsoft.com/office/drawing/2010/main" xmlns="">
+              <a14:hiddenFill xmlns="" xmlns:a14="http://schemas.microsoft.com/office/drawing/2010/main">
                 <a:solidFill>
                   <a:srgbClr val="FFFFFF"/>
                 </a:solidFill>
@@ -9512,7 +9516,7 @@
               </a:ln>
               <a:extLst>
                 <a:ext uri="{91240B29-F687-4f45-9708-019B960494DF}">
-                  <a14:hiddenLine xmlns:a14="http://schemas.microsoft.com/office/drawing/2010/main" xmlns="" w="9525">
+                  <a14:hiddenLine xmlns="" xmlns:a14="http://schemas.microsoft.com/office/drawing/2010/main" w="9525">
                     <a:solidFill>
                       <a:srgbClr val="000000"/>
                     </a:solidFill>
@@ -9602,7 +9606,7 @@
               </a:ln>
               <a:extLst>
                 <a:ext uri="{91240B29-F687-4f45-9708-019B960494DF}">
-                  <a14:hiddenLine xmlns:a14="http://schemas.microsoft.com/office/drawing/2010/main" xmlns="" w="9525">
+                  <a14:hiddenLine xmlns="" xmlns:a14="http://schemas.microsoft.com/office/drawing/2010/main" w="9525">
                     <a:solidFill>
                       <a:srgbClr val="000000"/>
                     </a:solidFill>
@@ -9692,7 +9696,7 @@
               </a:ln>
               <a:extLst>
                 <a:ext uri="{91240B29-F687-4f45-9708-019B960494DF}">
-                  <a14:hiddenLine xmlns:a14="http://schemas.microsoft.com/office/drawing/2010/main" xmlns="" w="9525">
+                  <a14:hiddenLine xmlns="" xmlns:a14="http://schemas.microsoft.com/office/drawing/2010/main" w="9525">
                     <a:solidFill>
                       <a:srgbClr val="000000"/>
                     </a:solidFill>
@@ -9754,7 +9758,7 @@
               </a:ln>
               <a:extLst>
                 <a:ext uri="{91240B29-F687-4f45-9708-019B960494DF}">
-                  <a14:hiddenLine xmlns:a14="http://schemas.microsoft.com/office/drawing/2010/main" xmlns="" w="9525">
+                  <a14:hiddenLine xmlns="" xmlns:a14="http://schemas.microsoft.com/office/drawing/2010/main" w="9525">
                     <a:solidFill>
                       <a:srgbClr val="000000"/>
                     </a:solidFill>
@@ -9844,7 +9848,7 @@
               </a:ln>
               <a:extLst>
                 <a:ext uri="{91240B29-F687-4f45-9708-019B960494DF}">
-                  <a14:hiddenLine xmlns:a14="http://schemas.microsoft.com/office/drawing/2010/main" xmlns="" w="9525">
+                  <a14:hiddenLine xmlns="" xmlns:a14="http://schemas.microsoft.com/office/drawing/2010/main" w="9525">
                     <a:solidFill>
                       <a:srgbClr val="000000"/>
                     </a:solidFill>
@@ -9906,7 +9910,7 @@
               </a:ln>
               <a:extLst>
                 <a:ext uri="{91240B29-F687-4f45-9708-019B960494DF}">
-                  <a14:hiddenLine xmlns:a14="http://schemas.microsoft.com/office/drawing/2010/main" xmlns="" w="9525">
+                  <a14:hiddenLine xmlns="" xmlns:a14="http://schemas.microsoft.com/office/drawing/2010/main" w="9525">
                     <a:solidFill>
                       <a:srgbClr val="000000"/>
                     </a:solidFill>
@@ -9968,7 +9972,7 @@
               </a:ln>
               <a:extLst>
                 <a:ext uri="{91240B29-F687-4f45-9708-019B960494DF}">
-                  <a14:hiddenLine xmlns:a14="http://schemas.microsoft.com/office/drawing/2010/main" xmlns="" w="9525">
+                  <a14:hiddenLine xmlns="" xmlns:a14="http://schemas.microsoft.com/office/drawing/2010/main" w="9525">
                     <a:solidFill>
                       <a:srgbClr val="000000"/>
                     </a:solidFill>
@@ -10058,7 +10062,7 @@
               </a:ln>
               <a:extLst>
                 <a:ext uri="{91240B29-F687-4f45-9708-019B960494DF}">
-                  <a14:hiddenLine xmlns:a14="http://schemas.microsoft.com/office/drawing/2010/main" xmlns="" w="9525">
+                  <a14:hiddenLine xmlns="" xmlns:a14="http://schemas.microsoft.com/office/drawing/2010/main" w="9525">
                     <a:solidFill>
                       <a:srgbClr val="000000"/>
                     </a:solidFill>
@@ -10148,7 +10152,7 @@
               </a:ln>
               <a:extLst>
                 <a:ext uri="{91240B29-F687-4f45-9708-019B960494DF}">
-                  <a14:hiddenLine xmlns:a14="http://schemas.microsoft.com/office/drawing/2010/main" xmlns="" w="9525">
+                  <a14:hiddenLine xmlns="" xmlns:a14="http://schemas.microsoft.com/office/drawing/2010/main" w="9525">
                     <a:solidFill>
                       <a:srgbClr val="000000"/>
                     </a:solidFill>
@@ -10210,7 +10214,7 @@
               </a:ln>
               <a:extLst>
                 <a:ext uri="{91240B29-F687-4f45-9708-019B960494DF}">
-                  <a14:hiddenLine xmlns:a14="http://schemas.microsoft.com/office/drawing/2010/main" xmlns="" w="9525">
+                  <a14:hiddenLine xmlns="" xmlns:a14="http://schemas.microsoft.com/office/drawing/2010/main" w="9525">
                     <a:solidFill>
                       <a:srgbClr val="000000"/>
                     </a:solidFill>
@@ -10320,7 +10324,7 @@
               </a:ln>
               <a:extLst>
                 <a:ext uri="{91240B29-F687-4f45-9708-019B960494DF}">
-                  <a14:hiddenLine xmlns:a14="http://schemas.microsoft.com/office/drawing/2010/main" xmlns="" w="9525">
+                  <a14:hiddenLine xmlns="" xmlns:a14="http://schemas.microsoft.com/office/drawing/2010/main" w="9525">
                     <a:solidFill>
                       <a:srgbClr val="000000"/>
                     </a:solidFill>
@@ -10404,7 +10408,7 @@
               </a:ln>
               <a:extLst>
                 <a:ext uri="{91240B29-F687-4f45-9708-019B960494DF}">
-                  <a14:hiddenLine xmlns:a14="http://schemas.microsoft.com/office/drawing/2010/main" xmlns="" w="9525">
+                  <a14:hiddenLine xmlns="" xmlns:a14="http://schemas.microsoft.com/office/drawing/2010/main" w="9525">
                     <a:solidFill>
                       <a:srgbClr val="000000"/>
                     </a:solidFill>
@@ -10466,7 +10470,7 @@
               </a:ln>
               <a:extLst>
                 <a:ext uri="{91240B29-F687-4f45-9708-019B960494DF}">
-                  <a14:hiddenLine xmlns:a14="http://schemas.microsoft.com/office/drawing/2010/main" xmlns="" w="9525">
+                  <a14:hiddenLine xmlns="" xmlns:a14="http://schemas.microsoft.com/office/drawing/2010/main" w="9525">
                     <a:solidFill>
                       <a:srgbClr val="000000"/>
                     </a:solidFill>
@@ -10528,7 +10532,7 @@
               </a:ln>
               <a:extLst>
                 <a:ext uri="{91240B29-F687-4f45-9708-019B960494DF}">
-                  <a14:hiddenLine xmlns:a14="http://schemas.microsoft.com/office/drawing/2010/main" xmlns="" w="9525">
+                  <a14:hiddenLine xmlns="" xmlns:a14="http://schemas.microsoft.com/office/drawing/2010/main" w="9525">
                     <a:solidFill>
                       <a:srgbClr val="000000"/>
                     </a:solidFill>
@@ -10618,7 +10622,7 @@
               </a:ln>
               <a:extLst>
                 <a:ext uri="{91240B29-F687-4f45-9708-019B960494DF}">
-                  <a14:hiddenLine xmlns:a14="http://schemas.microsoft.com/office/drawing/2010/main" xmlns="" w="9525">
+                  <a14:hiddenLine xmlns="" xmlns:a14="http://schemas.microsoft.com/office/drawing/2010/main" w="9525">
                     <a:solidFill>
                       <a:srgbClr val="000000"/>
                     </a:solidFill>
@@ -10652,7 +10656,7 @@
               </a:ln>
               <a:extLst>
                 <a:ext uri="{91240B29-F687-4f45-9708-019B960494DF}">
-                  <a14:hiddenLine xmlns:a14="http://schemas.microsoft.com/office/drawing/2010/main" xmlns="" w="9525">
+                  <a14:hiddenLine xmlns="" xmlns:a14="http://schemas.microsoft.com/office/drawing/2010/main" w="9525">
                     <a:solidFill>
                       <a:srgbClr val="000000"/>
                     </a:solidFill>
@@ -10717,7 +10721,7 @@
               </a:ln>
               <a:extLst>
                 <a:ext uri="{91240B29-F687-4f45-9708-019B960494DF}">
-                  <a14:hiddenLine xmlns:a14="http://schemas.microsoft.com/office/drawing/2010/main" xmlns="" w="9525">
+                  <a14:hiddenLine xmlns="" xmlns:a14="http://schemas.microsoft.com/office/drawing/2010/main" w="9525">
                     <a:solidFill>
                       <a:srgbClr val="000000"/>
                     </a:solidFill>
@@ -10807,7 +10811,7 @@
               </a:ln>
               <a:extLst>
                 <a:ext uri="{91240B29-F687-4f45-9708-019B960494DF}">
-                  <a14:hiddenLine xmlns:a14="http://schemas.microsoft.com/office/drawing/2010/main" xmlns="" w="9525">
+                  <a14:hiddenLine xmlns="" xmlns:a14="http://schemas.microsoft.com/office/drawing/2010/main" w="9525">
                     <a:solidFill>
                       <a:srgbClr val="000000"/>
                     </a:solidFill>
@@ -10869,7 +10873,7 @@
               </a:ln>
               <a:extLst>
                 <a:ext uri="{91240B29-F687-4f45-9708-019B960494DF}">
-                  <a14:hiddenLine xmlns:a14="http://schemas.microsoft.com/office/drawing/2010/main" xmlns="" w="9525">
+                  <a14:hiddenLine xmlns="" xmlns:a14="http://schemas.microsoft.com/office/drawing/2010/main" w="9525">
                     <a:solidFill>
                       <a:srgbClr val="000000"/>
                     </a:solidFill>
@@ -10959,7 +10963,7 @@
               </a:ln>
               <a:extLst>
                 <a:ext uri="{91240B29-F687-4f45-9708-019B960494DF}">
-                  <a14:hiddenLine xmlns:a14="http://schemas.microsoft.com/office/drawing/2010/main" xmlns="" w="9525">
+                  <a14:hiddenLine xmlns="" xmlns:a14="http://schemas.microsoft.com/office/drawing/2010/main" w="9525">
                     <a:solidFill>
                       <a:srgbClr val="000000"/>
                     </a:solidFill>
@@ -11024,7 +11028,7 @@
               </a:ln>
               <a:extLst>
                 <a:ext uri="{91240B29-F687-4f45-9708-019B960494DF}">
-                  <a14:hiddenLine xmlns:a14="http://schemas.microsoft.com/office/drawing/2010/main" xmlns="" w="9525">
+                  <a14:hiddenLine xmlns="" xmlns:a14="http://schemas.microsoft.com/office/drawing/2010/main" w="9525">
                     <a:solidFill>
                       <a:srgbClr val="000000"/>
                     </a:solidFill>
@@ -11086,7 +11090,7 @@
               </a:ln>
               <a:extLst>
                 <a:ext uri="{91240B29-F687-4f45-9708-019B960494DF}">
-                  <a14:hiddenLine xmlns:a14="http://schemas.microsoft.com/office/drawing/2010/main" xmlns="" w="9525">
+                  <a14:hiddenLine xmlns="" xmlns:a14="http://schemas.microsoft.com/office/drawing/2010/main" w="9525">
                     <a:solidFill>
                       <a:srgbClr val="000000"/>
                     </a:solidFill>
@@ -11176,7 +11180,7 @@
               </a:ln>
               <a:extLst>
                 <a:ext uri="{91240B29-F687-4f45-9708-019B960494DF}">
-                  <a14:hiddenLine xmlns:a14="http://schemas.microsoft.com/office/drawing/2010/main" xmlns="" w="9525">
+                  <a14:hiddenLine xmlns="" xmlns:a14="http://schemas.microsoft.com/office/drawing/2010/main" w="9525">
                     <a:solidFill>
                       <a:srgbClr val="000000"/>
                     </a:solidFill>
@@ -11266,7 +11270,7 @@
               </a:ln>
               <a:extLst>
                 <a:ext uri="{91240B29-F687-4f45-9708-019B960494DF}">
-                  <a14:hiddenLine xmlns:a14="http://schemas.microsoft.com/office/drawing/2010/main" xmlns="" w="9525">
+                  <a14:hiddenLine xmlns="" xmlns:a14="http://schemas.microsoft.com/office/drawing/2010/main" w="9525">
                     <a:solidFill>
                       <a:srgbClr val="000000"/>
                     </a:solidFill>
@@ -11331,7 +11335,7 @@
               </a:ln>
               <a:extLst>
                 <a:ext uri="{91240B29-F687-4f45-9708-019B960494DF}">
-                  <a14:hiddenLine xmlns:a14="http://schemas.microsoft.com/office/drawing/2010/main" xmlns="" w="9525">
+                  <a14:hiddenLine xmlns="" xmlns:a14="http://schemas.microsoft.com/office/drawing/2010/main" w="9525">
                     <a:solidFill>
                       <a:srgbClr val="000000"/>
                     </a:solidFill>
@@ -11451,7 +11455,7 @@
               </a:ln>
               <a:extLst>
                 <a:ext uri="{91240B29-F687-4f45-9708-019B960494DF}">
-                  <a14:hiddenLine xmlns:a14="http://schemas.microsoft.com/office/drawing/2010/main" xmlns="" w="9525">
+                  <a14:hiddenLine xmlns="" xmlns:a14="http://schemas.microsoft.com/office/drawing/2010/main" w="9525">
                     <a:solidFill>
                       <a:srgbClr val="000000"/>
                     </a:solidFill>
@@ -11549,7 +11553,7 @@
               </a:ln>
               <a:extLst>
                 <a:ext uri="{91240B29-F687-4f45-9708-019B960494DF}">
-                  <a14:hiddenLine xmlns:a14="http://schemas.microsoft.com/office/drawing/2010/main" xmlns="" w="9525">
+                  <a14:hiddenLine xmlns="" xmlns:a14="http://schemas.microsoft.com/office/drawing/2010/main" w="9525">
                     <a:solidFill>
                       <a:srgbClr val="000000"/>
                     </a:solidFill>
@@ -11664,7 +11668,7 @@
               </a:ln>
               <a:extLst>
                 <a:ext uri="{91240B29-F687-4f45-9708-019B960494DF}">
-                  <a14:hiddenLine xmlns:a14="http://schemas.microsoft.com/office/drawing/2010/main" xmlns="" w="9525">
+                  <a14:hiddenLine xmlns="" xmlns:a14="http://schemas.microsoft.com/office/drawing/2010/main" w="9525">
                     <a:solidFill>
                       <a:srgbClr val="000000"/>
                     </a:solidFill>
@@ -11754,7 +11758,7 @@
               </a:ln>
               <a:extLst>
                 <a:ext uri="{91240B29-F687-4f45-9708-019B960494DF}">
-                  <a14:hiddenLine xmlns:a14="http://schemas.microsoft.com/office/drawing/2010/main" xmlns="" w="9525">
+                  <a14:hiddenLine xmlns="" xmlns:a14="http://schemas.microsoft.com/office/drawing/2010/main" w="9525">
                     <a:solidFill>
                       <a:srgbClr val="000000"/>
                     </a:solidFill>
@@ -11819,7 +11823,7 @@
               </a:ln>
               <a:extLst>
                 <a:ext uri="{91240B29-F687-4f45-9708-019B960494DF}">
-                  <a14:hiddenLine xmlns:a14="http://schemas.microsoft.com/office/drawing/2010/main" xmlns="" w="9525">
+                  <a14:hiddenLine xmlns="" xmlns:a14="http://schemas.microsoft.com/office/drawing/2010/main" w="9525">
                     <a:solidFill>
                       <a:srgbClr val="000000"/>
                     </a:solidFill>
@@ -11909,7 +11913,7 @@
               </a:ln>
               <a:extLst>
                 <a:ext uri="{91240B29-F687-4f45-9708-019B960494DF}">
-                  <a14:hiddenLine xmlns:a14="http://schemas.microsoft.com/office/drawing/2010/main" xmlns="" w="9525">
+                  <a14:hiddenLine xmlns="" xmlns:a14="http://schemas.microsoft.com/office/drawing/2010/main" w="9525">
                     <a:solidFill>
                       <a:srgbClr val="000000"/>
                     </a:solidFill>
@@ -11977,7 +11981,7 @@
               </a:ln>
               <a:extLst>
                 <a:ext uri="{91240B29-F687-4f45-9708-019B960494DF}">
-                  <a14:hiddenLine xmlns:a14="http://schemas.microsoft.com/office/drawing/2010/main" xmlns="" w="9525">
+                  <a14:hiddenLine xmlns="" xmlns:a14="http://schemas.microsoft.com/office/drawing/2010/main" w="9525">
                     <a:solidFill>
                       <a:srgbClr val="000000"/>
                     </a:solidFill>
@@ -12067,7 +12071,7 @@
               </a:ln>
               <a:extLst>
                 <a:ext uri="{91240B29-F687-4f45-9708-019B960494DF}">
-                  <a14:hiddenLine xmlns:a14="http://schemas.microsoft.com/office/drawing/2010/main" xmlns="" w="9525">
+                  <a14:hiddenLine xmlns="" xmlns:a14="http://schemas.microsoft.com/office/drawing/2010/main" w="9525">
                     <a:solidFill>
                       <a:srgbClr val="000000"/>
                     </a:solidFill>
@@ -12135,7 +12139,7 @@
               </a:ln>
               <a:extLst>
                 <a:ext uri="{91240B29-F687-4f45-9708-019B960494DF}">
-                  <a14:hiddenLine xmlns:a14="http://schemas.microsoft.com/office/drawing/2010/main" xmlns="" w="9525">
+                  <a14:hiddenLine xmlns="" xmlns:a14="http://schemas.microsoft.com/office/drawing/2010/main" w="9525">
                     <a:solidFill>
                       <a:srgbClr val="000000"/>
                     </a:solidFill>
@@ -12225,7 +12229,7 @@
               </a:ln>
               <a:extLst>
                 <a:ext uri="{91240B29-F687-4f45-9708-019B960494DF}">
-                  <a14:hiddenLine xmlns:a14="http://schemas.microsoft.com/office/drawing/2010/main" xmlns="" w="9525">
+                  <a14:hiddenLine xmlns="" xmlns:a14="http://schemas.microsoft.com/office/drawing/2010/main" w="9525">
                     <a:solidFill>
                       <a:srgbClr val="000000"/>
                     </a:solidFill>
@@ -12259,7 +12263,7 @@
               </a:ln>
               <a:extLst>
                 <a:ext uri="{91240B29-F687-4f45-9708-019B960494DF}">
-                  <a14:hiddenLine xmlns:a14="http://schemas.microsoft.com/office/drawing/2010/main" xmlns="" w="9525">
+                  <a14:hiddenLine xmlns="" xmlns:a14="http://schemas.microsoft.com/office/drawing/2010/main" w="9525">
                     <a:solidFill>
                       <a:srgbClr val="000000"/>
                     </a:solidFill>
@@ -12400,7 +12404,7 @@
             <a:fld id="{48A87A34-81AB-432B-8DAE-1953F412C126}" type="datetimeFigureOut">
               <a:rPr lang="en-US" dirty="0"/>
               <a:pPr/>
-              <a:t>11/26/16</a:t>
+              <a:t>11/29/16</a:t>
             </a:fld>
             <a:endParaRPr lang="en-US" dirty="0"/>
           </a:p>
@@ -12878,6 +12882,13 @@
   <p:clrMapOvr>
     <a:masterClrMapping/>
   </p:clrMapOvr>
+  <p:timing>
+    <p:tnLst>
+      <p:par>
+        <p:cTn id="1" dur="indefinite" restart="never" nodeType="tmRoot"/>
+      </p:par>
+    </p:tnLst>
+  </p:timing>
 </p:sld>
 </file>
 
@@ -12915,7 +12926,7 @@
           <a:p>
             <a:r>
               <a:rPr lang="en-US" dirty="0" smtClean="0"/>
-              <a:t>Add platforms</a:t>
+              <a:t>Build and run</a:t>
             </a:r>
             <a:endParaRPr lang="en-US" dirty="0"/>
           </a:p>
@@ -12958,33 +12969,20 @@
                   <a:srgbClr val="FFFF00"/>
                 </a:solidFill>
               </a:rPr>
-              <a:t> platform add </a:t>
-            </a:r>
-            <a:r>
-              <a:rPr lang="en-US" dirty="0" err="1">
+              <a:t> </a:t>
+            </a:r>
+            <a:r>
+              <a:rPr lang="en-US" dirty="0" smtClean="0">
                 <a:solidFill>
                   <a:srgbClr val="FFFF00"/>
                 </a:solidFill>
               </a:rPr>
-              <a:t>ios</a:t>
-            </a:r>
+              <a:t>build</a:t>
+            </a:r>
+          </a:p>
+          <a:p>
             <a:r>
               <a:rPr lang="en-US" dirty="0">
-                <a:solidFill>
-                  <a:srgbClr val="FFFF00"/>
-                </a:solidFill>
-              </a:rPr>
-              <a:t> --save </a:t>
-            </a:r>
-            <a:endParaRPr lang="en-US" dirty="0" smtClean="0">
-              <a:solidFill>
-                <a:srgbClr val="FFFF00"/>
-              </a:solidFill>
-            </a:endParaRPr>
-          </a:p>
-          <a:p>
-            <a:r>
-              <a:rPr lang="en-US" dirty="0" smtClean="0">
                 <a:solidFill>
                   <a:srgbClr val="FFFF00"/>
                 </a:solidFill>
@@ -13005,7 +13003,80 @@
                   <a:srgbClr val="FFFF00"/>
                 </a:solidFill>
               </a:rPr>
-              <a:t> platform add android --save</a:t>
+              <a:t> build </a:t>
+            </a:r>
+            <a:r>
+              <a:rPr lang="en-US" dirty="0" err="1" smtClean="0">
+                <a:solidFill>
+                  <a:srgbClr val="FFFF00"/>
+                </a:solidFill>
+              </a:rPr>
+              <a:t>ios</a:t>
+            </a:r>
+            <a:endParaRPr lang="en-US" dirty="0" smtClean="0">
+              <a:solidFill>
+                <a:srgbClr val="FFFF00"/>
+              </a:solidFill>
+            </a:endParaRPr>
+          </a:p>
+          <a:p>
+            <a:r>
+              <a:rPr lang="en-US" dirty="0">
+                <a:solidFill>
+                  <a:srgbClr val="FFFF00"/>
+                </a:solidFill>
+              </a:rPr>
+              <a:t>$ </a:t>
+            </a:r>
+            <a:r>
+              <a:rPr lang="en-US" dirty="0" err="1">
+                <a:solidFill>
+                  <a:srgbClr val="FFFF00"/>
+                </a:solidFill>
+              </a:rPr>
+              <a:t>cordova</a:t>
+            </a:r>
+            <a:r>
+              <a:rPr lang="en-US" dirty="0">
+                <a:solidFill>
+                  <a:srgbClr val="FFFF00"/>
+                </a:solidFill>
+              </a:rPr>
+              <a:t> emulate </a:t>
+            </a:r>
+            <a:r>
+              <a:rPr lang="en-US" dirty="0" smtClean="0">
+                <a:solidFill>
+                  <a:srgbClr val="FFFF00"/>
+                </a:solidFill>
+              </a:rPr>
+              <a:t>android</a:t>
+            </a:r>
+          </a:p>
+          <a:p>
+            <a:r>
+              <a:rPr lang="en-US" dirty="0">
+                <a:solidFill>
+                  <a:srgbClr val="FFFF00"/>
+                </a:solidFill>
+              </a:rPr>
+              <a:t>$ </a:t>
+            </a:r>
+            <a:r>
+              <a:rPr lang="en-US" dirty="0" err="1">
+                <a:solidFill>
+                  <a:srgbClr val="FFFF00"/>
+                </a:solidFill>
+              </a:rPr>
+              <a:t>cordova</a:t>
+            </a:r>
+            <a:r>
+              <a:rPr lang="en-US" dirty="0">
+                <a:solidFill>
+                  <a:srgbClr val="FFFF00"/>
+                </a:solidFill>
+              </a:rPr>
+              <a:t> run android </a:t>
             </a:r>
           </a:p>
         </p:txBody>
@@ -13013,13 +13084,20 @@
     </p:spTree>
     <p:extLst>
       <p:ext uri="{BB962C8B-B14F-4D97-AF65-F5344CB8AC3E}">
-        <p14:creationId xmlns:p14="http://schemas.microsoft.com/office/powerpoint/2010/main" val="55703373"/>
+        <p14:creationId xmlns:p14="http://schemas.microsoft.com/office/powerpoint/2010/main" val="2146373354"/>
       </p:ext>
     </p:extLst>
   </p:cSld>
   <p:clrMapOvr>
     <a:masterClrMapping/>
   </p:clrMapOvr>
+  <p:timing>
+    <p:tnLst>
+      <p:par>
+        <p:cTn id="1" dur="indefinite" restart="never" nodeType="tmRoot"/>
+      </p:par>
+    </p:tnLst>
+  </p:timing>
 </p:sld>
 </file>
 
@@ -13057,7 +13135,7 @@
           <a:p>
             <a:r>
               <a:rPr lang="en-US" dirty="0" smtClean="0"/>
-              <a:t>Build and run</a:t>
+              <a:t>Add plugins</a:t>
             </a:r>
             <a:endParaRPr lang="en-US" dirty="0"/>
           </a:p>
@@ -13100,208 +13178,6 @@
                   <a:srgbClr val="FFFF00"/>
                 </a:solidFill>
               </a:rPr>
-              <a:t> </a:t>
-            </a:r>
-            <a:r>
-              <a:rPr lang="en-US" dirty="0" smtClean="0">
-                <a:solidFill>
-                  <a:srgbClr val="FFFF00"/>
-                </a:solidFill>
-              </a:rPr>
-              <a:t>build</a:t>
-            </a:r>
-          </a:p>
-          <a:p>
-            <a:r>
-              <a:rPr lang="en-US" dirty="0">
-                <a:solidFill>
-                  <a:srgbClr val="FFFF00"/>
-                </a:solidFill>
-              </a:rPr>
-              <a:t>$ </a:t>
-            </a:r>
-            <a:r>
-              <a:rPr lang="en-US" dirty="0" err="1">
-                <a:solidFill>
-                  <a:srgbClr val="FFFF00"/>
-                </a:solidFill>
-              </a:rPr>
-              <a:t>cordova</a:t>
-            </a:r>
-            <a:r>
-              <a:rPr lang="en-US" dirty="0">
-                <a:solidFill>
-                  <a:srgbClr val="FFFF00"/>
-                </a:solidFill>
-              </a:rPr>
-              <a:t> build </a:t>
-            </a:r>
-            <a:r>
-              <a:rPr lang="en-US" dirty="0" err="1" smtClean="0">
-                <a:solidFill>
-                  <a:srgbClr val="FFFF00"/>
-                </a:solidFill>
-              </a:rPr>
-              <a:t>ios</a:t>
-            </a:r>
-            <a:endParaRPr lang="en-US" dirty="0" smtClean="0">
-              <a:solidFill>
-                <a:srgbClr val="FFFF00"/>
-              </a:solidFill>
-            </a:endParaRPr>
-          </a:p>
-          <a:p>
-            <a:r>
-              <a:rPr lang="en-US" dirty="0">
-                <a:solidFill>
-                  <a:srgbClr val="FFFF00"/>
-                </a:solidFill>
-              </a:rPr>
-              <a:t>$ </a:t>
-            </a:r>
-            <a:r>
-              <a:rPr lang="en-US" dirty="0" err="1">
-                <a:solidFill>
-                  <a:srgbClr val="FFFF00"/>
-                </a:solidFill>
-              </a:rPr>
-              <a:t>cordova</a:t>
-            </a:r>
-            <a:r>
-              <a:rPr lang="en-US" dirty="0">
-                <a:solidFill>
-                  <a:srgbClr val="FFFF00"/>
-                </a:solidFill>
-              </a:rPr>
-              <a:t> emulate </a:t>
-            </a:r>
-            <a:r>
-              <a:rPr lang="en-US" dirty="0" smtClean="0">
-                <a:solidFill>
-                  <a:srgbClr val="FFFF00"/>
-                </a:solidFill>
-              </a:rPr>
-              <a:t>android</a:t>
-            </a:r>
-          </a:p>
-          <a:p>
-            <a:r>
-              <a:rPr lang="en-US" dirty="0">
-                <a:solidFill>
-                  <a:srgbClr val="FFFF00"/>
-                </a:solidFill>
-              </a:rPr>
-              <a:t>$ </a:t>
-            </a:r>
-            <a:r>
-              <a:rPr lang="en-US" dirty="0" err="1">
-                <a:solidFill>
-                  <a:srgbClr val="FFFF00"/>
-                </a:solidFill>
-              </a:rPr>
-              <a:t>cordova</a:t>
-            </a:r>
-            <a:r>
-              <a:rPr lang="en-US" dirty="0">
-                <a:solidFill>
-                  <a:srgbClr val="FFFF00"/>
-                </a:solidFill>
-              </a:rPr>
-              <a:t> run android </a:t>
-            </a:r>
-          </a:p>
-        </p:txBody>
-      </p:sp>
-    </p:spTree>
-    <p:extLst>
-      <p:ext uri="{BB962C8B-B14F-4D97-AF65-F5344CB8AC3E}">
-        <p14:creationId xmlns:p14="http://schemas.microsoft.com/office/powerpoint/2010/main" val="2146373354"/>
-      </p:ext>
-    </p:extLst>
-  </p:cSld>
-  <p:clrMapOvr>
-    <a:masterClrMapping/>
-  </p:clrMapOvr>
-</p:sld>
-</file>
-
-<file path=ppt/slides/slide12.xml><?xml version="1.0" encoding="utf-8"?>
-<p:sld xmlns:a="http://schemas.openxmlformats.org/drawingml/2006/main" xmlns:r="http://schemas.openxmlformats.org/officeDocument/2006/relationships" xmlns:p="http://schemas.openxmlformats.org/presentationml/2006/main">
-  <p:cSld>
-    <p:spTree>
-      <p:nvGrpSpPr>
-        <p:cNvPr id="1" name=""/>
-        <p:cNvGrpSpPr/>
-        <p:nvPr/>
-      </p:nvGrpSpPr>
-      <p:grpSpPr>
-        <a:xfrm>
-          <a:off x="0" y="0"/>
-          <a:ext cx="0" cy="0"/>
-          <a:chOff x="0" y="0"/>
-          <a:chExt cx="0" cy="0"/>
-        </a:xfrm>
-      </p:grpSpPr>
-      <p:sp>
-        <p:nvSpPr>
-          <p:cNvPr id="2" name="Title 1"/>
-          <p:cNvSpPr>
-            <a:spLocks noGrp="1"/>
-          </p:cNvSpPr>
-          <p:nvPr>
-            <p:ph type="title"/>
-          </p:nvPr>
-        </p:nvSpPr>
-        <p:spPr/>
-        <p:txBody>
-          <a:bodyPr/>
-          <a:lstStyle/>
-          <a:p>
-            <a:r>
-              <a:rPr lang="en-US" dirty="0" smtClean="0"/>
-              <a:t>Add plugins</a:t>
-            </a:r>
-            <a:endParaRPr lang="en-US" dirty="0"/>
-          </a:p>
-        </p:txBody>
-      </p:sp>
-      <p:sp>
-        <p:nvSpPr>
-          <p:cNvPr id="3" name="Content Placeholder 2"/>
-          <p:cNvSpPr>
-            <a:spLocks noGrp="1"/>
-          </p:cNvSpPr>
-          <p:nvPr>
-            <p:ph idx="1"/>
-          </p:nvPr>
-        </p:nvSpPr>
-        <p:spPr/>
-        <p:txBody>
-          <a:bodyPr/>
-          <a:lstStyle/>
-          <a:p>
-            <a:r>
-              <a:rPr lang="en-US" dirty="0">
-                <a:solidFill>
-                  <a:srgbClr val="FFFF00"/>
-                </a:solidFill>
-              </a:rPr>
-              <a:t>$ </a:t>
-            </a:r>
-            <a:r>
-              <a:rPr lang="en-US" dirty="0" err="1">
-                <a:solidFill>
-                  <a:srgbClr val="FFFF00"/>
-                </a:solidFill>
-              </a:rPr>
-              <a:t>cordova</a:t>
-            </a:r>
-            <a:r>
-              <a:rPr lang="en-US" dirty="0">
-                <a:solidFill>
-                  <a:srgbClr val="FFFF00"/>
-                </a:solidFill>
-              </a:rPr>
               <a:t> plugin add </a:t>
             </a:r>
             <a:r>
@@ -13407,10 +13283,17 @@
   <p:clrMapOvr>
     <a:masterClrMapping/>
   </p:clrMapOvr>
+  <p:timing>
+    <p:tnLst>
+      <p:par>
+        <p:cTn id="1" dur="indefinite" restart="never" nodeType="tmRoot"/>
+      </p:par>
+    </p:tnLst>
+  </p:timing>
 </p:sld>
 </file>
 
-<file path=ppt/slides/slide13.xml><?xml version="1.0" encoding="utf-8"?>
+<file path=ppt/slides/slide12.xml><?xml version="1.0" encoding="utf-8"?>
 <p:sld xmlns:a="http://schemas.openxmlformats.org/drawingml/2006/main" xmlns:r="http://schemas.openxmlformats.org/officeDocument/2006/relationships" xmlns:p="http://schemas.openxmlformats.org/presentationml/2006/main">
   <p:cSld>
     <p:spTree>
@@ -13485,10 +13368,17 @@
   <p:clrMapOvr>
     <a:masterClrMapping/>
   </p:clrMapOvr>
+  <p:timing>
+    <p:tnLst>
+      <p:par>
+        <p:cTn id="1" dur="indefinite" restart="never" nodeType="tmRoot"/>
+      </p:par>
+    </p:tnLst>
+  </p:timing>
 </p:sld>
 </file>
 
-<file path=ppt/slides/slide14.xml><?xml version="1.0" encoding="utf-8"?>
+<file path=ppt/slides/slide13.xml><?xml version="1.0" encoding="utf-8"?>
 <p:sld xmlns:a="http://schemas.openxmlformats.org/drawingml/2006/main" xmlns:r="http://schemas.openxmlformats.org/officeDocument/2006/relationships" xmlns:p="http://schemas.openxmlformats.org/presentationml/2006/main">
   <p:cSld>
     <p:spTree>
@@ -13545,10 +13435,17 @@
   <p:clrMapOvr>
     <a:masterClrMapping/>
   </p:clrMapOvr>
+  <p:timing>
+    <p:tnLst>
+      <p:par>
+        <p:cTn id="1" dur="indefinite" restart="never" nodeType="tmRoot"/>
+      </p:par>
+    </p:tnLst>
+  </p:timing>
 </p:sld>
 </file>
 
-<file path=ppt/slides/slide15.xml><?xml version="1.0" encoding="utf-8"?>
+<file path=ppt/slides/slide14.xml><?xml version="1.0" encoding="utf-8"?>
 <p:sld xmlns:a="http://schemas.openxmlformats.org/drawingml/2006/main" xmlns:r="http://schemas.openxmlformats.org/officeDocument/2006/relationships" xmlns:p="http://schemas.openxmlformats.org/presentationml/2006/main">
   <p:cSld>
     <p:spTree>
@@ -13605,10 +13502,17 @@
   <p:clrMapOvr>
     <a:masterClrMapping/>
   </p:clrMapOvr>
+  <p:timing>
+    <p:tnLst>
+      <p:par>
+        <p:cTn id="1" dur="indefinite" restart="never" nodeType="tmRoot"/>
+      </p:par>
+    </p:tnLst>
+  </p:timing>
 </p:sld>
 </file>
 
-<file path=ppt/slides/slide16.xml><?xml version="1.0" encoding="utf-8"?>
+<file path=ppt/slides/slide15.xml><?xml version="1.0" encoding="utf-8"?>
 <p:sld xmlns:a="http://schemas.openxmlformats.org/drawingml/2006/main" xmlns:r="http://schemas.openxmlformats.org/officeDocument/2006/relationships" xmlns:p="http://schemas.openxmlformats.org/presentationml/2006/main">
   <p:cSld>
     <p:spTree>
@@ -13665,6 +13569,114 @@
   <p:clrMapOvr>
     <a:masterClrMapping/>
   </p:clrMapOvr>
+  <p:timing>
+    <p:tnLst>
+      <p:par>
+        <p:cTn id="1" dur="indefinite" restart="never" nodeType="tmRoot"/>
+      </p:par>
+    </p:tnLst>
+  </p:timing>
+</p:sld>
+</file>
+
+<file path=ppt/slides/slide16.xml><?xml version="1.0" encoding="utf-8"?>
+<p:sld xmlns:a="http://schemas.openxmlformats.org/drawingml/2006/main" xmlns:r="http://schemas.openxmlformats.org/officeDocument/2006/relationships" xmlns:p="http://schemas.openxmlformats.org/presentationml/2006/main">
+  <p:cSld>
+    <p:spTree>
+      <p:nvGrpSpPr>
+        <p:cNvPr id="1" name=""/>
+        <p:cNvGrpSpPr/>
+        <p:nvPr/>
+      </p:nvGrpSpPr>
+      <p:grpSpPr>
+        <a:xfrm>
+          <a:off x="0" y="0"/>
+          <a:ext cx="0" cy="0"/>
+          <a:chOff x="0" y="0"/>
+          <a:chExt cx="0" cy="0"/>
+        </a:xfrm>
+      </p:grpSpPr>
+      <p:sp>
+        <p:nvSpPr>
+          <p:cNvPr id="2" name="Title 1"/>
+          <p:cNvSpPr>
+            <a:spLocks noGrp="1"/>
+          </p:cNvSpPr>
+          <p:nvPr>
+            <p:ph type="title"/>
+          </p:nvPr>
+        </p:nvSpPr>
+        <p:spPr/>
+        <p:txBody>
+          <a:bodyPr/>
+          <a:lstStyle/>
+          <a:p>
+            <a:r>
+              <a:rPr lang="en-US" dirty="0" smtClean="0"/>
+              <a:t>However</a:t>
+            </a:r>
+            <a:r>
+              <a:rPr lang="mr-IN" dirty="0" smtClean="0"/>
+              <a:t>…</a:t>
+            </a:r>
+            <a:endParaRPr lang="en-US" dirty="0"/>
+          </a:p>
+        </p:txBody>
+      </p:sp>
+      <p:sp>
+        <p:nvSpPr>
+          <p:cNvPr id="3" name="Content Placeholder 2"/>
+          <p:cNvSpPr>
+            <a:spLocks noGrp="1"/>
+          </p:cNvSpPr>
+          <p:nvPr>
+            <p:ph idx="1"/>
+          </p:nvPr>
+        </p:nvSpPr>
+        <p:spPr/>
+        <p:txBody>
+          <a:bodyPr/>
+          <a:lstStyle/>
+          <a:p>
+            <a:r>
+              <a:rPr lang="en-US" dirty="0" smtClean="0"/>
+              <a:t>Reliance on third party tools and code</a:t>
+            </a:r>
+          </a:p>
+          <a:p>
+            <a:r>
+              <a:rPr lang="en-US" dirty="0" smtClean="0"/>
+              <a:t>Adds more complexity to the development architecture</a:t>
+            </a:r>
+          </a:p>
+          <a:p>
+            <a:r>
+              <a:rPr lang="en-US" dirty="0" smtClean="0"/>
+              <a:t>Potential unexpected bugs</a:t>
+            </a:r>
+          </a:p>
+          <a:p>
+            <a:endParaRPr lang="en-US" dirty="0"/>
+          </a:p>
+        </p:txBody>
+      </p:sp>
+    </p:spTree>
+    <p:extLst>
+      <p:ext uri="{BB962C8B-B14F-4D97-AF65-F5344CB8AC3E}">
+        <p14:creationId xmlns:p14="http://schemas.microsoft.com/office/powerpoint/2010/main" val="1308250446"/>
+      </p:ext>
+    </p:extLst>
+  </p:cSld>
+  <p:clrMapOvr>
+    <a:masterClrMapping/>
+  </p:clrMapOvr>
+  <p:timing>
+    <p:tnLst>
+      <p:par>
+        <p:cTn id="1" dur="indefinite" restart="never" nodeType="tmRoot"/>
+      </p:par>
+    </p:tnLst>
+  </p:timing>
 </p:sld>
 </file>
 
@@ -13702,11 +13714,7 @@
           <a:p>
             <a:r>
               <a:rPr lang="en-US" dirty="0" smtClean="0"/>
-              <a:t>However</a:t>
-            </a:r>
-            <a:r>
-              <a:rPr lang="mr-IN" dirty="0" smtClean="0"/>
-              <a:t>…</a:t>
+              <a:t>To use or not to use</a:t>
             </a:r>
             <a:endParaRPr lang="en-US" dirty="0"/>
           </a:p>
@@ -13714,12 +13722,12 @@
       </p:sp>
       <p:sp>
         <p:nvSpPr>
-          <p:cNvPr id="3" name="Content Placeholder 2"/>
+          <p:cNvPr id="3" name="Text Placeholder 2"/>
           <p:cNvSpPr>
             <a:spLocks noGrp="1"/>
           </p:cNvSpPr>
           <p:nvPr>
-            <p:ph idx="1"/>
+            <p:ph type="body" sz="half" idx="2"/>
           </p:nvPr>
         </p:nvSpPr>
         <p:spPr/>
@@ -13727,38 +13735,27 @@
           <a:bodyPr/>
           <a:lstStyle/>
           <a:p>
-            <a:r>
-              <a:rPr lang="en-US" dirty="0" smtClean="0"/>
-              <a:t>Reliance on third party tools and code</a:t>
-            </a:r>
-          </a:p>
-          <a:p>
-            <a:r>
-              <a:rPr lang="en-US" dirty="0" smtClean="0"/>
-              <a:t>Adds more complexity to the development architecture</a:t>
-            </a:r>
-          </a:p>
-          <a:p>
-            <a:r>
-              <a:rPr lang="en-US" dirty="0" smtClean="0"/>
-              <a:t>Potential unexpected bugs</a:t>
-            </a:r>
-          </a:p>
-          <a:p>
-            <a:endParaRPr lang="en-US" dirty="0"/>
+            <a:endParaRPr lang="en-US"/>
           </a:p>
         </p:txBody>
       </p:sp>
     </p:spTree>
     <p:extLst>
       <p:ext uri="{BB962C8B-B14F-4D97-AF65-F5344CB8AC3E}">
-        <p14:creationId xmlns:p14="http://schemas.microsoft.com/office/powerpoint/2010/main" val="1308250446"/>
+        <p14:creationId xmlns:p14="http://schemas.microsoft.com/office/powerpoint/2010/main" val="634428622"/>
       </p:ext>
     </p:extLst>
   </p:cSld>
   <p:clrMapOvr>
     <a:masterClrMapping/>
   </p:clrMapOvr>
+  <p:timing>
+    <p:tnLst>
+      <p:par>
+        <p:cTn id="1" dur="indefinite" restart="never" nodeType="tmRoot"/>
+      </p:par>
+    </p:tnLst>
+  </p:timing>
 </p:sld>
 </file>
 
@@ -13796,78 +13793,6 @@
           <a:p>
             <a:r>
               <a:rPr lang="en-US" dirty="0" smtClean="0"/>
-              <a:t>To use or not to use</a:t>
-            </a:r>
-            <a:endParaRPr lang="en-US" dirty="0"/>
-          </a:p>
-        </p:txBody>
-      </p:sp>
-      <p:sp>
-        <p:nvSpPr>
-          <p:cNvPr id="3" name="Text Placeholder 2"/>
-          <p:cNvSpPr>
-            <a:spLocks noGrp="1"/>
-          </p:cNvSpPr>
-          <p:nvPr>
-            <p:ph type="body" sz="half" idx="2"/>
-          </p:nvPr>
-        </p:nvSpPr>
-        <p:spPr/>
-        <p:txBody>
-          <a:bodyPr/>
-          <a:lstStyle/>
-          <a:p>
-            <a:endParaRPr lang="en-US"/>
-          </a:p>
-        </p:txBody>
-      </p:sp>
-    </p:spTree>
-    <p:extLst>
-      <p:ext uri="{BB962C8B-B14F-4D97-AF65-F5344CB8AC3E}">
-        <p14:creationId xmlns:p14="http://schemas.microsoft.com/office/powerpoint/2010/main" val="634428622"/>
-      </p:ext>
-    </p:extLst>
-  </p:cSld>
-  <p:clrMapOvr>
-    <a:masterClrMapping/>
-  </p:clrMapOvr>
-</p:sld>
-</file>
-
-<file path=ppt/slides/slide19.xml><?xml version="1.0" encoding="utf-8"?>
-<p:sld xmlns:a="http://schemas.openxmlformats.org/drawingml/2006/main" xmlns:r="http://schemas.openxmlformats.org/officeDocument/2006/relationships" xmlns:p="http://schemas.openxmlformats.org/presentationml/2006/main">
-  <p:cSld>
-    <p:spTree>
-      <p:nvGrpSpPr>
-        <p:cNvPr id="1" name=""/>
-        <p:cNvGrpSpPr/>
-        <p:nvPr/>
-      </p:nvGrpSpPr>
-      <p:grpSpPr>
-        <a:xfrm>
-          <a:off x="0" y="0"/>
-          <a:ext cx="0" cy="0"/>
-          <a:chOff x="0" y="0"/>
-          <a:chExt cx="0" cy="0"/>
-        </a:xfrm>
-      </p:grpSpPr>
-      <p:sp>
-        <p:nvSpPr>
-          <p:cNvPr id="2" name="Title 1"/>
-          <p:cNvSpPr>
-            <a:spLocks noGrp="1"/>
-          </p:cNvSpPr>
-          <p:nvPr>
-            <p:ph type="title"/>
-          </p:nvPr>
-        </p:nvSpPr>
-        <p:spPr/>
-        <p:txBody>
-          <a:bodyPr/>
-          <a:lstStyle/>
-          <a:p>
-            <a:r>
-              <a:rPr lang="en-US" dirty="0" smtClean="0"/>
               <a:t>Image and word citation</a:t>
             </a:r>
             <a:endParaRPr lang="en-US" dirty="0"/>
@@ -13972,6 +13897,13 @@
   <p:clrMapOvr>
     <a:masterClrMapping/>
   </p:clrMapOvr>
+  <p:timing>
+    <p:tnLst>
+      <p:par>
+        <p:cTn id="1" dur="indefinite" restart="never" nodeType="tmRoot"/>
+      </p:par>
+    </p:tnLst>
+  </p:timing>
 </p:sld>
 </file>
 
@@ -14014,7 +13946,7 @@
         </p:blipFill>
         <p:spPr>
           <a:xfrm>
-            <a:off x="1929653" y="820271"/>
+            <a:off x="2010335" y="2104465"/>
             <a:ext cx="2589791" cy="2568388"/>
           </a:xfrm>
           <a:prstGeom prst="rect">
@@ -14024,7 +13956,7 @@
       </p:pic>
       <p:pic>
         <p:nvPicPr>
-          <p:cNvPr id="3" name="Picture 2"/>
+          <p:cNvPr id="4" name="Picture 3"/>
           <p:cNvPicPr>
             <a:picLocks noChangeAspect="1"/>
           </p:cNvPicPr>
@@ -14044,37 +13976,7 @@
         </p:blipFill>
         <p:spPr>
           <a:xfrm>
-            <a:off x="7171765" y="820271"/>
-            <a:ext cx="2554941" cy="2554941"/>
-          </a:xfrm>
-          <a:prstGeom prst="rect">
-            <a:avLst/>
-          </a:prstGeom>
-        </p:spPr>
-      </p:pic>
-      <p:pic>
-        <p:nvPicPr>
-          <p:cNvPr id="4" name="Picture 3"/>
-          <p:cNvPicPr>
-            <a:picLocks noChangeAspect="1"/>
-          </p:cNvPicPr>
-          <p:nvPr/>
-        </p:nvPicPr>
-        <p:blipFill>
-          <a:blip r:embed="rId4">
-            <a:extLst>
-              <a:ext uri="{28A0092B-C50C-407E-A947-70E740481C1C}">
-                <a14:useLocalDpi xmlns:a14="http://schemas.microsoft.com/office/drawing/2010/main" val="0"/>
-              </a:ext>
-            </a:extLst>
-          </a:blip>
-          <a:stretch>
-            <a:fillRect/>
-          </a:stretch>
-        </p:blipFill>
-        <p:spPr>
-          <a:xfrm>
-            <a:off x="3653117" y="3917576"/>
+            <a:off x="6060140" y="2104465"/>
             <a:ext cx="4369750" cy="2456329"/>
           </a:xfrm>
           <a:prstGeom prst="rect">
@@ -14092,6 +13994,13 @@
   <p:clrMapOvr>
     <a:masterClrMapping/>
   </p:clrMapOvr>
+  <p:timing>
+    <p:tnLst>
+      <p:par>
+        <p:cTn id="1" dur="indefinite" restart="never" nodeType="tmRoot"/>
+      </p:par>
+    </p:tnLst>
+  </p:timing>
 </p:sld>
 </file>
 
@@ -14216,6 +14125,13 @@
   <p:clrMapOvr>
     <a:masterClrMapping/>
   </p:clrMapOvr>
+  <p:timing>
+    <p:tnLst>
+      <p:par>
+        <p:cTn id="1" dur="indefinite" restart="never" nodeType="tmRoot"/>
+      </p:par>
+    </p:tnLst>
+  </p:timing>
 </p:sld>
 </file>
 
@@ -14340,6 +14256,13 @@
   <p:clrMapOvr>
     <a:masterClrMapping/>
   </p:clrMapOvr>
+  <p:timing>
+    <p:tnLst>
+      <p:par>
+        <p:cTn id="1" dur="indefinite" restart="never" nodeType="tmRoot"/>
+      </p:par>
+    </p:tnLst>
+  </p:timing>
 </p:sld>
 </file>
 
@@ -14469,6 +14392,13 @@
   <p:clrMapOvr>
     <a:masterClrMapping/>
   </p:clrMapOvr>
+  <p:timing>
+    <p:tnLst>
+      <p:par>
+        <p:cTn id="1" dur="indefinite" restart="never" nodeType="tmRoot"/>
+      </p:par>
+    </p:tnLst>
+  </p:timing>
 </p:sld>
 </file>
 
@@ -14576,6 +14506,13 @@
   <p:clrMapOvr>
     <a:masterClrMapping/>
   </p:clrMapOvr>
+  <p:timing>
+    <p:tnLst>
+      <p:par>
+        <p:cTn id="1" dur="indefinite" restart="never" nodeType="tmRoot"/>
+      </p:par>
+    </p:tnLst>
+  </p:timing>
 </p:sld>
 </file>
 
@@ -14611,49 +14548,66 @@
           <a:bodyPr/>
           <a:lstStyle/>
           <a:p>
+            <a:r>
+              <a:rPr lang="en-US" dirty="0" smtClean="0"/>
+              <a:t>Popular frameworks</a:t>
+            </a:r>
             <a:endParaRPr lang="en-US" dirty="0"/>
           </a:p>
         </p:txBody>
       </p:sp>
-      <p:pic>
-        <p:nvPicPr>
-          <p:cNvPr id="4" name="Content Placeholder 3"/>
-          <p:cNvPicPr>
-            <a:picLocks noGrp="1" noChangeAspect="1"/>
-          </p:cNvPicPr>
+      <p:sp>
+        <p:nvSpPr>
+          <p:cNvPr id="3" name="Content Placeholder 2"/>
+          <p:cNvSpPr>
+            <a:spLocks noGrp="1"/>
+          </p:cNvSpPr>
           <p:nvPr>
             <p:ph idx="1"/>
           </p:nvPr>
-        </p:nvPicPr>
-        <p:blipFill>
-          <a:blip r:embed="rId2">
-            <a:extLst>
-              <a:ext uri="{28A0092B-C50C-407E-A947-70E740481C1C}">
-                <a14:useLocalDpi xmlns:a14="http://schemas.microsoft.com/office/drawing/2010/main" val="0"/>
-              </a:ext>
-            </a:extLst>
-          </a:blip>
-          <a:stretch>
-            <a:fillRect/>
-          </a:stretch>
-        </p:blipFill>
-        <p:spPr>
-          <a:xfrm>
-            <a:off x="1141413" y="618517"/>
-            <a:ext cx="9905998" cy="5496621"/>
-          </a:xfrm>
-        </p:spPr>
-      </p:pic>
+        </p:nvSpPr>
+        <p:spPr/>
+        <p:txBody>
+          <a:bodyPr/>
+          <a:lstStyle/>
+          <a:p>
+            <a:r>
+              <a:rPr lang="en-US" dirty="0" smtClean="0"/>
+              <a:t>Cordova</a:t>
+            </a:r>
+          </a:p>
+          <a:p>
+            <a:r>
+              <a:rPr lang="en-US" dirty="0" smtClean="0"/>
+              <a:t>Native Scripts</a:t>
+            </a:r>
+          </a:p>
+          <a:p>
+            <a:r>
+              <a:rPr lang="en-US" dirty="0" err="1" smtClean="0"/>
+              <a:t>etc</a:t>
+            </a:r>
+            <a:endParaRPr lang="en-US" dirty="0"/>
+          </a:p>
+        </p:txBody>
+      </p:sp>
     </p:spTree>
     <p:extLst>
       <p:ext uri="{BB962C8B-B14F-4D97-AF65-F5344CB8AC3E}">
-        <p14:creationId xmlns:p14="http://schemas.microsoft.com/office/powerpoint/2010/main" val="1493732080"/>
+        <p14:creationId xmlns:p14="http://schemas.microsoft.com/office/powerpoint/2010/main" val="531418588"/>
       </p:ext>
     </p:extLst>
   </p:cSld>
   <p:clrMapOvr>
     <a:masterClrMapping/>
   </p:clrMapOvr>
+  <p:timing>
+    <p:tnLst>
+      <p:par>
+        <p:cTn id="1" dur="indefinite" restart="never" nodeType="tmRoot"/>
+      </p:par>
+    </p:tnLst>
+  </p:timing>
 </p:sld>
 </file>
 
@@ -14691,7 +14645,7 @@
           <a:p>
             <a:r>
               <a:rPr lang="en-US" dirty="0" smtClean="0"/>
-              <a:t>Popular frameworks</a:t>
+              <a:t>create the app</a:t>
             </a:r>
             <a:endParaRPr lang="en-US" dirty="0"/>
           </a:p>
@@ -14713,21 +14667,93 @@
           <a:lstStyle/>
           <a:p>
             <a:r>
-              <a:rPr lang="en-US" dirty="0" smtClean="0"/>
-              <a:t>Cordova</a:t>
-            </a:r>
-          </a:p>
-          <a:p>
-            <a:r>
-              <a:rPr lang="en-US" dirty="0" smtClean="0"/>
-              <a:t>Native Scripts</a:t>
-            </a:r>
-          </a:p>
-          <a:p>
-            <a:r>
-              <a:rPr lang="en-US" dirty="0" err="1" smtClean="0"/>
-              <a:t>etc</a:t>
-            </a:r>
+              <a:rPr lang="en-US" dirty="0">
+                <a:solidFill>
+                  <a:srgbClr val="FFFF00"/>
+                </a:solidFill>
+              </a:rPr>
+              <a:t>$ </a:t>
+            </a:r>
+            <a:r>
+              <a:rPr lang="en-US" dirty="0" err="1">
+                <a:solidFill>
+                  <a:srgbClr val="FFFF00"/>
+                </a:solidFill>
+              </a:rPr>
+              <a:t>cordova</a:t>
+            </a:r>
+            <a:r>
+              <a:rPr lang="en-US" dirty="0">
+                <a:solidFill>
+                  <a:srgbClr val="FFFF00"/>
+                </a:solidFill>
+              </a:rPr>
+              <a:t> create hello </a:t>
+            </a:r>
+            <a:r>
+              <a:rPr lang="en-US" dirty="0" err="1">
+                <a:solidFill>
+                  <a:srgbClr val="FFFF00"/>
+                </a:solidFill>
+              </a:rPr>
+              <a:t>com.example.hello</a:t>
+            </a:r>
+            <a:r>
+              <a:rPr lang="en-US" dirty="0">
+                <a:solidFill>
+                  <a:srgbClr val="FFFF00"/>
+                </a:solidFill>
+              </a:rPr>
+              <a:t> </a:t>
+            </a:r>
+            <a:r>
+              <a:rPr lang="en-US" dirty="0" err="1">
+                <a:solidFill>
+                  <a:srgbClr val="FFFF00"/>
+                </a:solidFill>
+              </a:rPr>
+              <a:t>HelloWorld</a:t>
+            </a:r>
+            <a:endParaRPr lang="en-US" dirty="0">
+              <a:solidFill>
+                <a:srgbClr val="FFFF00"/>
+              </a:solidFill>
+            </a:endParaRPr>
+          </a:p>
+          <a:p>
+            <a:endParaRPr lang="en-US" dirty="0"/>
+          </a:p>
+          <a:p>
+            <a:r>
+              <a:rPr lang="en-US" dirty="0"/>
+              <a:t>This creates the required directory structure for your </a:t>
+            </a:r>
+            <a:r>
+              <a:rPr lang="en-US" dirty="0" err="1"/>
+              <a:t>cordova</a:t>
+            </a:r>
+            <a:r>
+              <a:rPr lang="en-US" dirty="0"/>
+              <a:t> app. By default, the </a:t>
+            </a:r>
+            <a:r>
+              <a:rPr lang="en-US" dirty="0" err="1"/>
+              <a:t>cordova</a:t>
+            </a:r>
+            <a:r>
+              <a:rPr lang="en-US" dirty="0"/>
+              <a:t> create script generates a skeletal web-based application whose home page is the project's www/</a:t>
+            </a:r>
+            <a:r>
+              <a:rPr lang="en-US" dirty="0" err="1"/>
+              <a:t>index.html</a:t>
+            </a:r>
+            <a:r>
+              <a:rPr lang="en-US" dirty="0"/>
+              <a:t> file.</a:t>
+            </a:r>
+          </a:p>
+          <a:p>
             <a:endParaRPr lang="en-US" dirty="0"/>
           </a:p>
         </p:txBody>
@@ -14735,13 +14761,20 @@
     </p:spTree>
     <p:extLst>
       <p:ext uri="{BB962C8B-B14F-4D97-AF65-F5344CB8AC3E}">
-        <p14:creationId xmlns:p14="http://schemas.microsoft.com/office/powerpoint/2010/main" val="531418588"/>
+        <p14:creationId xmlns:p14="http://schemas.microsoft.com/office/powerpoint/2010/main" val="221223274"/>
       </p:ext>
     </p:extLst>
   </p:cSld>
   <p:clrMapOvr>
     <a:masterClrMapping/>
   </p:clrMapOvr>
+  <p:timing>
+    <p:tnLst>
+      <p:par>
+        <p:cTn id="1" dur="indefinite" restart="never" nodeType="tmRoot"/>
+      </p:par>
+    </p:tnLst>
+  </p:timing>
 </p:sld>
 </file>
 
@@ -14779,7 +14812,7 @@
           <a:p>
             <a:r>
               <a:rPr lang="en-US" dirty="0" smtClean="0"/>
-              <a:t>create the app</a:t>
+              <a:t>Add platforms</a:t>
             </a:r>
             <a:endParaRPr lang="en-US" dirty="0"/>
           </a:p>
@@ -14822,7 +14855,7 @@
                   <a:srgbClr val="FFFF00"/>
                 </a:solidFill>
               </a:rPr>
-              <a:t> create hello </a:t>
+              <a:t> platform add </a:t>
             </a:r>
             <a:r>
               <a:rPr lang="en-US" dirty="0" err="1">
@@ -14830,7 +14863,7 @@
                   <a:srgbClr val="FFFF00"/>
                 </a:solidFill>
               </a:rPr>
-              <a:t>com.example.hello</a:t>
+              <a:t>ios</a:t>
             </a:r>
             <a:r>
               <a:rPr lang="en-US" dirty="0">
@@ -14838,7 +14871,22 @@
                   <a:srgbClr val="FFFF00"/>
                 </a:solidFill>
               </a:rPr>
-              <a:t> </a:t>
+              <a:t> --save </a:t>
+            </a:r>
+            <a:endParaRPr lang="en-US" dirty="0" smtClean="0">
+              <a:solidFill>
+                <a:srgbClr val="FFFF00"/>
+              </a:solidFill>
+            </a:endParaRPr>
+          </a:p>
+          <a:p>
+            <a:r>
+              <a:rPr lang="en-US" dirty="0" smtClean="0">
+                <a:solidFill>
+                  <a:srgbClr val="FFFF00"/>
+                </a:solidFill>
+              </a:rPr>
+              <a:t>$ </a:t>
             </a:r>
             <a:r>
               <a:rPr lang="en-US" dirty="0" err="1">
@@ -14846,62 +14894,36 @@
                   <a:srgbClr val="FFFF00"/>
                 </a:solidFill>
               </a:rPr>
-              <a:t>HelloWorld</a:t>
-            </a:r>
-            <a:endParaRPr lang="en-US" dirty="0">
-              <a:solidFill>
-                <a:srgbClr val="FFFF00"/>
-              </a:solidFill>
-            </a:endParaRPr>
-          </a:p>
-          <a:p>
-            <a:endParaRPr lang="en-US" dirty="0"/>
-          </a:p>
-          <a:p>
-            <a:r>
-              <a:rPr lang="en-US" dirty="0"/>
-              <a:t>This creates the required directory structure for your </a:t>
-            </a:r>
-            <a:r>
-              <a:rPr lang="en-US" dirty="0" err="1"/>
               <a:t>cordova</a:t>
             </a:r>
             <a:r>
-              <a:rPr lang="en-US" dirty="0"/>
-              <a:t> app. By default, the </a:t>
-            </a:r>
-            <a:r>
-              <a:rPr lang="en-US" dirty="0" err="1"/>
-              <a:t>cordova</a:t>
-            </a:r>
-            <a:r>
-              <a:rPr lang="en-US" dirty="0"/>
-              <a:t> create script generates a skeletal web-based application whose home page is the project's www/</a:t>
-            </a:r>
-            <a:r>
-              <a:rPr lang="en-US" dirty="0" err="1"/>
-              <a:t>index.html</a:t>
-            </a:r>
-            <a:r>
-              <a:rPr lang="en-US" dirty="0"/>
-              <a:t> file.</a:t>
-            </a:r>
-          </a:p>
-          <a:p>
-            <a:endParaRPr lang="en-US" dirty="0"/>
+              <a:rPr lang="en-US" dirty="0">
+                <a:solidFill>
+                  <a:srgbClr val="FFFF00"/>
+                </a:solidFill>
+              </a:rPr>
+              <a:t> platform add android --save</a:t>
+            </a:r>
           </a:p>
         </p:txBody>
       </p:sp>
     </p:spTree>
     <p:extLst>
       <p:ext uri="{BB962C8B-B14F-4D97-AF65-F5344CB8AC3E}">
-        <p14:creationId xmlns:p14="http://schemas.microsoft.com/office/powerpoint/2010/main" val="221223274"/>
+        <p14:creationId xmlns:p14="http://schemas.microsoft.com/office/powerpoint/2010/main" val="55703373"/>
       </p:ext>
     </p:extLst>
   </p:cSld>
   <p:clrMapOvr>
     <a:masterClrMapping/>
   </p:clrMapOvr>
+  <p:timing>
+    <p:tnLst>
+      <p:par>
+        <p:cTn id="1" dur="indefinite" restart="never" nodeType="tmRoot"/>
+      </p:par>
+    </p:tnLst>
+  </p:timing>
 </p:sld>
 </file>
 

</xml_diff>